<commit_message>
Updated for Meeting 2
</commit_message>
<xml_diff>
--- a/Meeting Notes/Powerpoints they are the same as the pdfs/Coding Club Meeting 2.pptx
+++ b/Meeting Notes/Powerpoints they are the same as the pdfs/Coding Club Meeting 2.pptx
@@ -22,6 +22,16 @@
     <p:sldId id="269" r:id="rId16"/>
     <p:sldId id="270" r:id="rId17"/>
     <p:sldId id="272" r:id="rId18"/>
+    <p:sldId id="273" r:id="rId19"/>
+    <p:sldId id="276" r:id="rId20"/>
+    <p:sldId id="274" r:id="rId21"/>
+    <p:sldId id="275" r:id="rId22"/>
+    <p:sldId id="277" r:id="rId23"/>
+    <p:sldId id="278" r:id="rId24"/>
+    <p:sldId id="279" r:id="rId25"/>
+    <p:sldId id="281" r:id="rId26"/>
+    <p:sldId id="282" r:id="rId27"/>
+    <p:sldId id="280" r:id="rId28"/>
   </p:sldIdLst>
   <p:sldSz cx="7772400" cy="10058400"/>
   <p:notesSz cx="6858000" cy="9144000"/>
@@ -3929,15 +3939,7 @@
           <a:p>
             <a:r>
               <a:rPr lang="en-US" dirty="0"/>
-              <a:t>Since we are making a start menu, we do not want our sprites to be showing when the game is first starting. While they can be in a hidden state, this is not always going </a:t>
-            </a:r>
-            <a:r>
-              <a:rPr lang="en-US" dirty="0" err="1"/>
-              <a:t>ot</a:t>
-            </a:r>
-            <a:r>
-              <a:rPr lang="en-US" dirty="0"/>
-              <a:t> be true, so lets add a quick little code to all our game pieces saying to hide when the green flag is pressed.</a:t>
+              <a:t>Since we are making a start menu, we do not want our sprites to be showing when the game is first starting. While they can be in a hidden state, this is not always going to be true, so lets add a quick little code to all our game pieces saying to hide when the green flag is pressed.</a:t>
             </a:r>
           </a:p>
         </p:txBody>
@@ -3994,7 +3996,7 @@
         </p:blipFill>
         <p:spPr>
           <a:xfrm>
-            <a:off x="2491916" y="7205837"/>
+            <a:off x="2533650" y="7307741"/>
             <a:ext cx="2705100" cy="2343150"/>
           </a:xfrm>
           <a:prstGeom prst="rect">
@@ -4629,7 +4631,7 @@
         <p:spPr>
           <a:xfrm>
             <a:off x="753035" y="1167975"/>
-            <a:ext cx="6216383" cy="923330"/>
+            <a:ext cx="6216383" cy="1200329"/>
           </a:xfrm>
           <a:prstGeom prst="rect">
             <a:avLst/>
@@ -4644,7 +4646,7 @@
           <a:p>
             <a:r>
               <a:rPr lang="en-US" dirty="0"/>
-              <a:t>Up until now, we have just structured our game to fit into a planned game loop, which if we mapped it out visually would look something like this:</a:t>
+              <a:t>Up until now, we have just structured our game to fit into a planned game loop, which if we mapped it out visually would look something like this with arrows indicating how we can travel between states:</a:t>
             </a:r>
           </a:p>
         </p:txBody>
@@ -4709,17 +4711,6 @@
               <a:t>In Game</a:t>
             </a:r>
           </a:p>
-          <a:p>
-            <a:pPr algn="ctr"/>
-            <a:r>
-              <a:rPr lang="en-US" sz="1400" dirty="0">
-                <a:solidFill>
-                  <a:schemeClr val="tx1"/>
-                </a:solidFill>
-              </a:rPr>
-              <a:t>(Starting Condition)</a:t>
-            </a:r>
-          </a:p>
         </p:txBody>
       </p:sp>
       <p:sp>
@@ -4886,6 +4877,17 @@
               <a:t>Start Menu</a:t>
             </a:r>
           </a:p>
+          <a:p>
+            <a:pPr algn="ctr"/>
+            <a:r>
+              <a:rPr lang="en-US" sz="1200" dirty="0">
+                <a:solidFill>
+                  <a:schemeClr val="tx1"/>
+                </a:solidFill>
+              </a:rPr>
+              <a:t>(Starting Condition)</a:t>
+            </a:r>
+          </a:p>
         </p:txBody>
       </p:sp>
       <p:cxnSp>
@@ -4929,10 +4931,498 @@
           </a:fontRef>
         </p:style>
       </p:cxnSp>
+      <p:sp>
+        <p:nvSpPr>
+          <p:cNvPr id="6" name="Arrow: Circular 5">
+            <a:extLst>
+              <a:ext uri="{FF2B5EF4-FFF2-40B4-BE49-F238E27FC236}">
+                <a16:creationId xmlns:a16="http://schemas.microsoft.com/office/drawing/2014/main" id="{2871ECEE-9EB3-6CB2-B2EB-DFC1CBDD57A7}"/>
+              </a:ext>
+            </a:extLst>
+          </p:cNvPr>
+          <p:cNvSpPr/>
+          <p:nvPr/>
+        </p:nvSpPr>
+        <p:spPr>
+          <a:xfrm rot="10800000">
+            <a:off x="3895805" y="2730487"/>
+            <a:ext cx="2220685" cy="1474801"/>
+          </a:xfrm>
+          <a:prstGeom prst="circularArrow">
+            <a:avLst>
+              <a:gd name="adj1" fmla="val 1420"/>
+              <a:gd name="adj2" fmla="val 641237"/>
+              <a:gd name="adj3" fmla="val 21146194"/>
+              <a:gd name="adj4" fmla="val 10800000"/>
+              <a:gd name="adj5" fmla="val 4668"/>
+            </a:avLst>
+          </a:prstGeom>
+        </p:spPr>
+        <p:style>
+          <a:lnRef idx="2">
+            <a:schemeClr val="accent1">
+              <a:shade val="50000"/>
+            </a:schemeClr>
+          </a:lnRef>
+          <a:fillRef idx="1">
+            <a:schemeClr val="accent1"/>
+          </a:fillRef>
+          <a:effectRef idx="0">
+            <a:schemeClr val="accent1"/>
+          </a:effectRef>
+          <a:fontRef idx="minor">
+            <a:schemeClr val="lt1"/>
+          </a:fontRef>
+        </p:style>
+        <p:txBody>
+          <a:bodyPr rtlCol="0" anchor="ctr"/>
+          <a:lstStyle/>
+          <a:p>
+            <a:pPr algn="ctr"/>
+            <a:endParaRPr lang="en-US">
+              <a:solidFill>
+                <a:schemeClr val="tx1"/>
+              </a:solidFill>
+            </a:endParaRPr>
+          </a:p>
+        </p:txBody>
+      </p:sp>
+      <p:sp>
+        <p:nvSpPr>
+          <p:cNvPr id="8" name="TextBox 7">
+            <a:extLst>
+              <a:ext uri="{FF2B5EF4-FFF2-40B4-BE49-F238E27FC236}">
+                <a16:creationId xmlns:a16="http://schemas.microsoft.com/office/drawing/2014/main" id="{76E63FD3-1279-F9F6-BBAA-C93883F0E45F}"/>
+              </a:ext>
+            </a:extLst>
+          </p:cNvPr>
+          <p:cNvSpPr txBox="1"/>
+          <p:nvPr/>
+        </p:nvSpPr>
+        <p:spPr>
+          <a:xfrm>
+            <a:off x="775245" y="4330275"/>
+            <a:ext cx="6216383" cy="1754326"/>
+          </a:xfrm>
+          <a:prstGeom prst="rect">
+            <a:avLst/>
+          </a:prstGeom>
+          <a:noFill/>
+        </p:spPr>
+        <p:txBody>
+          <a:bodyPr wrap="square" rtlCol="0">
+            <a:spAutoFit/>
+          </a:bodyPr>
+          <a:lstStyle/>
+          <a:p>
+            <a:r>
+              <a:rPr lang="en-US" dirty="0"/>
+              <a:t>As you can see, there can be a lot of moving parts in structuring the game loop, especially as they get more and more complicated. In the future we will work on modularizing this system to make it easy to track and edit, but for now the actual game we have made is not very fun, so lets work on that. For now.</a:t>
+            </a:r>
+          </a:p>
+        </p:txBody>
+      </p:sp>
     </p:spTree>
     <p:extLst>
       <p:ext uri="{BB962C8B-B14F-4D97-AF65-F5344CB8AC3E}">
         <p14:creationId xmlns:p14="http://schemas.microsoft.com/office/powerpoint/2010/main" val="22269912"/>
+      </p:ext>
+    </p:extLst>
+  </p:cSld>
+  <p:clrMapOvr>
+    <a:masterClrMapping/>
+  </p:clrMapOvr>
+</p:sld>
+</file>
+
+<file path=ppt/slides/slide18.xml><?xml version="1.0" encoding="utf-8"?>
+<p:sld xmlns:a="http://schemas.openxmlformats.org/drawingml/2006/main" xmlns:r="http://schemas.openxmlformats.org/officeDocument/2006/relationships" xmlns:p="http://schemas.openxmlformats.org/presentationml/2006/main">
+  <p:cSld>
+    <p:spTree>
+      <p:nvGrpSpPr>
+        <p:cNvPr id="1" name=""/>
+        <p:cNvGrpSpPr/>
+        <p:nvPr/>
+      </p:nvGrpSpPr>
+      <p:grpSpPr>
+        <a:xfrm>
+          <a:off x="0" y="0"/>
+          <a:ext cx="0" cy="0"/>
+          <a:chOff x="0" y="0"/>
+          <a:chExt cx="0" cy="0"/>
+        </a:xfrm>
+      </p:grpSpPr>
+      <p:sp>
+        <p:nvSpPr>
+          <p:cNvPr id="2" name="Title 1">
+            <a:extLst>
+              <a:ext uri="{FF2B5EF4-FFF2-40B4-BE49-F238E27FC236}">
+                <a16:creationId xmlns:a16="http://schemas.microsoft.com/office/drawing/2014/main" id="{8D85D4F4-60D1-89DD-C8CB-DECC3BE58501}"/>
+              </a:ext>
+            </a:extLst>
+          </p:cNvPr>
+          <p:cNvSpPr>
+            <a:spLocks noGrp="1"/>
+          </p:cNvSpPr>
+          <p:nvPr>
+            <p:ph type="ctrTitle"/>
+          </p:nvPr>
+        </p:nvSpPr>
+        <p:spPr>
+          <a:xfrm>
+            <a:off x="582930" y="115279"/>
+            <a:ext cx="6606540" cy="1052696"/>
+          </a:xfrm>
+        </p:spPr>
+        <p:txBody>
+          <a:bodyPr>
+            <a:normAutofit/>
+          </a:bodyPr>
+          <a:lstStyle/>
+          <a:p>
+            <a:r>
+              <a:rPr lang="en-US" dirty="0"/>
+              <a:t>Improving Our Game</a:t>
+            </a:r>
+          </a:p>
+        </p:txBody>
+      </p:sp>
+      <p:sp>
+        <p:nvSpPr>
+          <p:cNvPr id="8" name="TextBox 7">
+            <a:extLst>
+              <a:ext uri="{FF2B5EF4-FFF2-40B4-BE49-F238E27FC236}">
+                <a16:creationId xmlns:a16="http://schemas.microsoft.com/office/drawing/2014/main" id="{76E63FD3-1279-F9F6-BBAA-C93883F0E45F}"/>
+              </a:ext>
+            </a:extLst>
+          </p:cNvPr>
+          <p:cNvSpPr txBox="1"/>
+          <p:nvPr/>
+        </p:nvSpPr>
+        <p:spPr>
+          <a:xfrm>
+            <a:off x="778008" y="1167975"/>
+            <a:ext cx="6216383" cy="1477328"/>
+          </a:xfrm>
+          <a:prstGeom prst="rect">
+            <a:avLst/>
+          </a:prstGeom>
+          <a:noFill/>
+        </p:spPr>
+        <p:txBody>
+          <a:bodyPr wrap="square" rtlCol="0">
+            <a:spAutoFit/>
+          </a:bodyPr>
+          <a:lstStyle/>
+          <a:p>
+            <a:r>
+              <a:rPr lang="en-US" dirty="0"/>
+              <a:t>From earlier we made our player capable of moving, but the enemy we made the player to avoid is a little to easy to dodge, so lets make the enemy more interesting and challenging to deal with. To keep it simple, lets just say we want our character to move around randomly, so lets add this to our code:</a:t>
+            </a:r>
+          </a:p>
+        </p:txBody>
+      </p:sp>
+      <p:pic>
+        <p:nvPicPr>
+          <p:cNvPr id="11" name="Picture 10">
+            <a:extLst>
+              <a:ext uri="{FF2B5EF4-FFF2-40B4-BE49-F238E27FC236}">
+                <a16:creationId xmlns:a16="http://schemas.microsoft.com/office/drawing/2014/main" id="{1F3DBBE0-C48F-F935-7CF9-156C2D7B5A4C}"/>
+              </a:ext>
+            </a:extLst>
+          </p:cNvPr>
+          <p:cNvPicPr>
+            <a:picLocks noChangeAspect="1"/>
+          </p:cNvPicPr>
+          <p:nvPr/>
+        </p:nvPicPr>
+        <p:blipFill>
+          <a:blip r:embed="rId2"/>
+          <a:stretch>
+            <a:fillRect/>
+          </a:stretch>
+        </p:blipFill>
+        <p:spPr>
+          <a:xfrm>
+            <a:off x="1647759" y="2800349"/>
+            <a:ext cx="4476882" cy="2743281"/>
+          </a:xfrm>
+          <a:prstGeom prst="rect">
+            <a:avLst/>
+          </a:prstGeom>
+        </p:spPr>
+      </p:pic>
+      <p:sp>
+        <p:nvSpPr>
+          <p:cNvPr id="13" name="TextBox 12">
+            <a:extLst>
+              <a:ext uri="{FF2B5EF4-FFF2-40B4-BE49-F238E27FC236}">
+                <a16:creationId xmlns:a16="http://schemas.microsoft.com/office/drawing/2014/main" id="{C96368E9-0BCA-C9E5-68A5-AD935CAAD333}"/>
+              </a:ext>
+            </a:extLst>
+          </p:cNvPr>
+          <p:cNvSpPr txBox="1"/>
+          <p:nvPr/>
+        </p:nvSpPr>
+        <p:spPr>
+          <a:xfrm>
+            <a:off x="778008" y="5722487"/>
+            <a:ext cx="6216383" cy="2585323"/>
+          </a:xfrm>
+          <a:prstGeom prst="rect">
+            <a:avLst/>
+          </a:prstGeom>
+          <a:noFill/>
+        </p:spPr>
+        <p:txBody>
+          <a:bodyPr wrap="square" rtlCol="0">
+            <a:spAutoFit/>
+          </a:bodyPr>
+          <a:lstStyle/>
+          <a:p>
+            <a:r>
+              <a:rPr lang="en-US" dirty="0"/>
+              <a:t>This still leaves us with a game so easy that its boring, so lets make it so that the game gets harder as we progress. We can do this in a variety ways, but how about for now we will try out the clone feature. The clone feature makes a clone of a sprite. Through this we can have multiple enemies without having to manually create them. Lets make a code that clones the enemy every few seconds. We will delete these clones once the player loses.</a:t>
+            </a:r>
+          </a:p>
+          <a:p>
+            <a:endParaRPr lang="en-US" dirty="0"/>
+          </a:p>
+        </p:txBody>
+      </p:sp>
+      <p:pic>
+        <p:nvPicPr>
+          <p:cNvPr id="15" name="Picture 14">
+            <a:extLst>
+              <a:ext uri="{FF2B5EF4-FFF2-40B4-BE49-F238E27FC236}">
+                <a16:creationId xmlns:a16="http://schemas.microsoft.com/office/drawing/2014/main" id="{DA3249D4-CC97-812E-7BEF-AFD3564F52C4}"/>
+              </a:ext>
+            </a:extLst>
+          </p:cNvPr>
+          <p:cNvPicPr>
+            <a:picLocks noChangeAspect="1"/>
+          </p:cNvPicPr>
+          <p:nvPr/>
+        </p:nvPicPr>
+        <p:blipFill>
+          <a:blip r:embed="rId3"/>
+          <a:stretch>
+            <a:fillRect/>
+          </a:stretch>
+        </p:blipFill>
+        <p:spPr>
+          <a:xfrm>
+            <a:off x="1452563" y="7858075"/>
+            <a:ext cx="5081588" cy="1938822"/>
+          </a:xfrm>
+          <a:prstGeom prst="rect">
+            <a:avLst/>
+          </a:prstGeom>
+        </p:spPr>
+      </p:pic>
+    </p:spTree>
+    <p:extLst>
+      <p:ext uri="{BB962C8B-B14F-4D97-AF65-F5344CB8AC3E}">
+        <p14:creationId xmlns:p14="http://schemas.microsoft.com/office/powerpoint/2010/main" val="2855418575"/>
+      </p:ext>
+    </p:extLst>
+  </p:cSld>
+  <p:clrMapOvr>
+    <a:masterClrMapping/>
+  </p:clrMapOvr>
+</p:sld>
+</file>
+
+<file path=ppt/slides/slide19.xml><?xml version="1.0" encoding="utf-8"?>
+<p:sld xmlns:a="http://schemas.openxmlformats.org/drawingml/2006/main" xmlns:r="http://schemas.openxmlformats.org/officeDocument/2006/relationships" xmlns:p="http://schemas.openxmlformats.org/presentationml/2006/main">
+  <p:cSld>
+    <p:spTree>
+      <p:nvGrpSpPr>
+        <p:cNvPr id="1" name=""/>
+        <p:cNvGrpSpPr/>
+        <p:nvPr/>
+      </p:nvGrpSpPr>
+      <p:grpSpPr>
+        <a:xfrm>
+          <a:off x="0" y="0"/>
+          <a:ext cx="0" cy="0"/>
+          <a:chOff x="0" y="0"/>
+          <a:chExt cx="0" cy="0"/>
+        </a:xfrm>
+      </p:grpSpPr>
+      <p:sp>
+        <p:nvSpPr>
+          <p:cNvPr id="2" name="Title 1">
+            <a:extLst>
+              <a:ext uri="{FF2B5EF4-FFF2-40B4-BE49-F238E27FC236}">
+                <a16:creationId xmlns:a16="http://schemas.microsoft.com/office/drawing/2014/main" id="{8D85D4F4-60D1-89DD-C8CB-DECC3BE58501}"/>
+              </a:ext>
+            </a:extLst>
+          </p:cNvPr>
+          <p:cNvSpPr>
+            <a:spLocks noGrp="1"/>
+          </p:cNvSpPr>
+          <p:nvPr>
+            <p:ph type="ctrTitle"/>
+          </p:nvPr>
+        </p:nvSpPr>
+        <p:spPr>
+          <a:xfrm>
+            <a:off x="582930" y="115279"/>
+            <a:ext cx="6606540" cy="1052696"/>
+          </a:xfrm>
+        </p:spPr>
+        <p:txBody>
+          <a:bodyPr>
+            <a:normAutofit/>
+          </a:bodyPr>
+          <a:lstStyle/>
+          <a:p>
+            <a:r>
+              <a:rPr lang="en-US" dirty="0"/>
+              <a:t>Improving Our Game</a:t>
+            </a:r>
+          </a:p>
+        </p:txBody>
+      </p:sp>
+      <p:sp>
+        <p:nvSpPr>
+          <p:cNvPr id="8" name="TextBox 7">
+            <a:extLst>
+              <a:ext uri="{FF2B5EF4-FFF2-40B4-BE49-F238E27FC236}">
+                <a16:creationId xmlns:a16="http://schemas.microsoft.com/office/drawing/2014/main" id="{76E63FD3-1279-F9F6-BBAA-C93883F0E45F}"/>
+              </a:ext>
+            </a:extLst>
+          </p:cNvPr>
+          <p:cNvSpPr txBox="1"/>
+          <p:nvPr/>
+        </p:nvSpPr>
+        <p:spPr>
+          <a:xfrm>
+            <a:off x="778008" y="1167975"/>
+            <a:ext cx="6216383" cy="5909310"/>
+          </a:xfrm>
+          <a:prstGeom prst="rect">
+            <a:avLst/>
+          </a:prstGeom>
+          <a:noFill/>
+        </p:spPr>
+        <p:txBody>
+          <a:bodyPr wrap="square" rtlCol="0">
+            <a:spAutoFit/>
+          </a:bodyPr>
+          <a:lstStyle/>
+          <a:p>
+            <a:r>
+              <a:rPr lang="en-US" dirty="0"/>
+              <a:t>We can improve our game more by adding some individuality to our clones. Lets make a new variable and call it “Enemy Speed”, but this time check “For this Sprite Only”. It is important that you make this variable in the enemy sprite, otherwise the enemy sprite will not be able to utilize the variable.</a:t>
+            </a:r>
+          </a:p>
+          <a:p>
+            <a:endParaRPr lang="en-US" dirty="0"/>
+          </a:p>
+          <a:p>
+            <a:endParaRPr lang="en-US" dirty="0"/>
+          </a:p>
+          <a:p>
+            <a:endParaRPr lang="en-US" dirty="0"/>
+          </a:p>
+          <a:p>
+            <a:endParaRPr lang="en-US" dirty="0"/>
+          </a:p>
+          <a:p>
+            <a:endParaRPr lang="en-US" dirty="0"/>
+          </a:p>
+          <a:p>
+            <a:endParaRPr lang="en-US" dirty="0"/>
+          </a:p>
+          <a:p>
+            <a:endParaRPr lang="en-US" dirty="0"/>
+          </a:p>
+          <a:p>
+            <a:endParaRPr lang="en-US" dirty="0"/>
+          </a:p>
+          <a:p>
+            <a:endParaRPr lang="en-US" dirty="0"/>
+          </a:p>
+          <a:p>
+            <a:endParaRPr lang="en-US" dirty="0"/>
+          </a:p>
+          <a:p>
+            <a:endParaRPr lang="en-US" dirty="0"/>
+          </a:p>
+          <a:p>
+            <a:r>
+              <a:rPr lang="en-US" dirty="0"/>
+              <a:t>Now the variable is pertaining to this sprite only, and does not exist outside of the code of that specific sprite. This also applies to clones, so now, we can edit our code for the clones so that each one has a different variable. Lets use this to adjust how much each sprite moves every time the code loops.</a:t>
+            </a:r>
+          </a:p>
+        </p:txBody>
+      </p:sp>
+      <p:pic>
+        <p:nvPicPr>
+          <p:cNvPr id="4" name="Picture 3">
+            <a:extLst>
+              <a:ext uri="{FF2B5EF4-FFF2-40B4-BE49-F238E27FC236}">
+                <a16:creationId xmlns:a16="http://schemas.microsoft.com/office/drawing/2014/main" id="{0B8AAC74-5F8C-7371-62F4-7046A9486931}"/>
+              </a:ext>
+            </a:extLst>
+          </p:cNvPr>
+          <p:cNvPicPr>
+            <a:picLocks noChangeAspect="1"/>
+          </p:cNvPicPr>
+          <p:nvPr/>
+        </p:nvPicPr>
+        <p:blipFill>
+          <a:blip r:embed="rId2"/>
+          <a:stretch>
+            <a:fillRect/>
+          </a:stretch>
+        </p:blipFill>
+        <p:spPr>
+          <a:xfrm>
+            <a:off x="2245659" y="2681375"/>
+            <a:ext cx="3281082" cy="2779915"/>
+          </a:xfrm>
+          <a:prstGeom prst="rect">
+            <a:avLst/>
+          </a:prstGeom>
+        </p:spPr>
+      </p:pic>
+      <p:pic>
+        <p:nvPicPr>
+          <p:cNvPr id="6" name="Picture 5">
+            <a:extLst>
+              <a:ext uri="{FF2B5EF4-FFF2-40B4-BE49-F238E27FC236}">
+                <a16:creationId xmlns:a16="http://schemas.microsoft.com/office/drawing/2014/main" id="{684A5AD9-BE0C-4A2E-0C7E-26ECA12E3FF5}"/>
+              </a:ext>
+            </a:extLst>
+          </p:cNvPr>
+          <p:cNvPicPr>
+            <a:picLocks noChangeAspect="1"/>
+          </p:cNvPicPr>
+          <p:nvPr/>
+        </p:nvPicPr>
+        <p:blipFill>
+          <a:blip r:embed="rId3"/>
+          <a:stretch>
+            <a:fillRect/>
+          </a:stretch>
+        </p:blipFill>
+        <p:spPr>
+          <a:xfrm>
+            <a:off x="582929" y="7146337"/>
+            <a:ext cx="6606540" cy="2666795"/>
+          </a:xfrm>
+          <a:prstGeom prst="rect">
+            <a:avLst/>
+          </a:prstGeom>
+        </p:spPr>
+      </p:pic>
+    </p:spTree>
+    <p:extLst>
+      <p:ext uri="{BB962C8B-B14F-4D97-AF65-F5344CB8AC3E}">
+        <p14:creationId xmlns:p14="http://schemas.microsoft.com/office/powerpoint/2010/main" val="2972025899"/>
       </p:ext>
     </p:extLst>
   </p:cSld>
@@ -5007,7 +5497,7 @@
         <p:spPr>
           <a:xfrm>
             <a:off x="322729" y="1652067"/>
-            <a:ext cx="7115416" cy="1754326"/>
+            <a:ext cx="7115416" cy="3416320"/>
           </a:xfrm>
           <a:prstGeom prst="rect">
             <a:avLst/>
@@ -5026,7 +5516,7 @@
             </a:pPr>
             <a:r>
               <a:rPr lang="en-US" dirty="0"/>
-              <a:t>Get more familiar with some of the functions in scratch, including if and while statements,  sprite cloning, variables and lists, custom blocks, and sensing and operator blocks by creating a basic game</a:t>
+              <a:t>Get more familiar with some of the functions in scratch, including if and while statements, sprite cloning, variables and lists, custom blocks, and sensing and operator blocks by creating a basic game</a:t>
             </a:r>
           </a:p>
           <a:p>
@@ -5039,7 +5529,66 @@
             </a:pPr>
             <a:r>
               <a:rPr lang="en-US" dirty="0"/>
-              <a:t>Learn some techniques for code structure to keep coding and structure for editing the code organized</a:t>
+              <a:t>Learn what a game loop is and how we can create one</a:t>
+            </a:r>
+          </a:p>
+          <a:p>
+            <a:endParaRPr lang="en-US" dirty="0"/>
+          </a:p>
+          <a:p>
+            <a:r>
+              <a:rPr lang="en-US" dirty="0"/>
+              <a:t>Our game will have:</a:t>
+            </a:r>
+          </a:p>
+          <a:p>
+            <a:pPr marL="285750" indent="-285750">
+              <a:buFontTx/>
+              <a:buChar char="-"/>
+            </a:pPr>
+            <a:r>
+              <a:rPr lang="en-US" dirty="0"/>
+              <a:t>Start Menu</a:t>
+            </a:r>
+          </a:p>
+          <a:p>
+            <a:pPr marL="285750" indent="-285750">
+              <a:buFontTx/>
+              <a:buChar char="-"/>
+            </a:pPr>
+            <a:r>
+              <a:rPr lang="en-US" dirty="0"/>
+              <a:t>A player and enemy</a:t>
+            </a:r>
+          </a:p>
+          <a:p>
+            <a:pPr marL="285750" indent="-285750">
+              <a:buFontTx/>
+              <a:buChar char="-"/>
+            </a:pPr>
+            <a:r>
+              <a:rPr lang="en-US" dirty="0"/>
+              <a:t>Losing Screen</a:t>
+            </a:r>
+          </a:p>
+          <a:p>
+            <a:pPr marL="285750" indent="-285750">
+              <a:buFontTx/>
+              <a:buChar char="-"/>
+            </a:pPr>
+            <a:r>
+              <a:rPr lang="en-US" dirty="0"/>
+              <a:t>Score</a:t>
+            </a:r>
+          </a:p>
+          <a:p>
+            <a:pPr marL="285750" indent="-285750">
+              <a:buFontTx/>
+              <a:buChar char="-"/>
+            </a:pPr>
+            <a:r>
+              <a:rPr lang="en-US" dirty="0"/>
+              <a:t>Leaderboard</a:t>
             </a:r>
           </a:p>
         </p:txBody>
@@ -5048,6 +5597,2123 @@
     <p:extLst>
       <p:ext uri="{BB962C8B-B14F-4D97-AF65-F5344CB8AC3E}">
         <p14:creationId xmlns:p14="http://schemas.microsoft.com/office/powerpoint/2010/main" val="1255834717"/>
+      </p:ext>
+    </p:extLst>
+  </p:cSld>
+  <p:clrMapOvr>
+    <a:masterClrMapping/>
+  </p:clrMapOvr>
+</p:sld>
+</file>
+
+<file path=ppt/slides/slide20.xml><?xml version="1.0" encoding="utf-8"?>
+<p:sld xmlns:a="http://schemas.openxmlformats.org/drawingml/2006/main" xmlns:r="http://schemas.openxmlformats.org/officeDocument/2006/relationships" xmlns:p="http://schemas.openxmlformats.org/presentationml/2006/main">
+  <p:cSld>
+    <p:spTree>
+      <p:nvGrpSpPr>
+        <p:cNvPr id="1" name=""/>
+        <p:cNvGrpSpPr/>
+        <p:nvPr/>
+      </p:nvGrpSpPr>
+      <p:grpSpPr>
+        <a:xfrm>
+          <a:off x="0" y="0"/>
+          <a:ext cx="0" cy="0"/>
+          <a:chOff x="0" y="0"/>
+          <a:chExt cx="0" cy="0"/>
+        </a:xfrm>
+      </p:grpSpPr>
+      <p:sp>
+        <p:nvSpPr>
+          <p:cNvPr id="13" name="TextBox 12">
+            <a:extLst>
+              <a:ext uri="{FF2B5EF4-FFF2-40B4-BE49-F238E27FC236}">
+                <a16:creationId xmlns:a16="http://schemas.microsoft.com/office/drawing/2014/main" id="{C96368E9-0BCA-C9E5-68A5-AD935CAAD333}"/>
+              </a:ext>
+            </a:extLst>
+          </p:cNvPr>
+          <p:cNvSpPr txBox="1"/>
+          <p:nvPr/>
+        </p:nvSpPr>
+        <p:spPr>
+          <a:xfrm>
+            <a:off x="778008" y="2126785"/>
+            <a:ext cx="6216383" cy="3416320"/>
+          </a:xfrm>
+          <a:prstGeom prst="rect">
+            <a:avLst/>
+          </a:prstGeom>
+          <a:noFill/>
+        </p:spPr>
+        <p:txBody>
+          <a:bodyPr wrap="square" rtlCol="0">
+            <a:spAutoFit/>
+          </a:bodyPr>
+          <a:lstStyle/>
+          <a:p>
+            <a:r>
+              <a:rPr lang="en-US" dirty="0"/>
+              <a:t>With this simple addition to the game, we made it rather challenging as time goes on. To finish with our game, lets add a score system. To do this, lets just make a new variable that is reset when we receive a start game message and counts up as long as the player does not lose. We can also have a sprite say the score when the game ends to tell the player how well they did.</a:t>
+            </a:r>
+          </a:p>
+          <a:p>
+            <a:endParaRPr lang="en-US" dirty="0"/>
+          </a:p>
+          <a:p>
+            <a:r>
+              <a:rPr lang="en-US" dirty="0"/>
+              <a:t>One way of doing this could be as is shown below on the Losing Screen Sprite:</a:t>
+            </a:r>
+          </a:p>
+          <a:p>
+            <a:endParaRPr lang="en-US" dirty="0"/>
+          </a:p>
+          <a:p>
+            <a:endParaRPr lang="en-US" dirty="0"/>
+          </a:p>
+        </p:txBody>
+      </p:sp>
+      <p:sp>
+        <p:nvSpPr>
+          <p:cNvPr id="4" name="Title 3">
+            <a:extLst>
+              <a:ext uri="{FF2B5EF4-FFF2-40B4-BE49-F238E27FC236}">
+                <a16:creationId xmlns:a16="http://schemas.microsoft.com/office/drawing/2014/main" id="{4803E82E-B25A-4A73-94A2-BBE1E2927A43}"/>
+              </a:ext>
+            </a:extLst>
+          </p:cNvPr>
+          <p:cNvSpPr>
+            <a:spLocks noGrp="1"/>
+          </p:cNvSpPr>
+          <p:nvPr>
+            <p:ph type="ctrTitle"/>
+          </p:nvPr>
+        </p:nvSpPr>
+        <p:spPr>
+          <a:xfrm>
+            <a:off x="206679" y="466700"/>
+            <a:ext cx="7394258" cy="1518921"/>
+          </a:xfrm>
+        </p:spPr>
+        <p:txBody>
+          <a:bodyPr/>
+          <a:lstStyle/>
+          <a:p>
+            <a:r>
+              <a:rPr lang="en-US" dirty="0"/>
+              <a:t>Adding a Score System to Our Game</a:t>
+            </a:r>
+          </a:p>
+        </p:txBody>
+      </p:sp>
+      <p:pic>
+        <p:nvPicPr>
+          <p:cNvPr id="6" name="Picture 5">
+            <a:extLst>
+              <a:ext uri="{FF2B5EF4-FFF2-40B4-BE49-F238E27FC236}">
+                <a16:creationId xmlns:a16="http://schemas.microsoft.com/office/drawing/2014/main" id="{6C149BE3-70A5-2748-0357-2F2FF2641818}"/>
+              </a:ext>
+            </a:extLst>
+          </p:cNvPr>
+          <p:cNvPicPr>
+            <a:picLocks noChangeAspect="1"/>
+          </p:cNvPicPr>
+          <p:nvPr/>
+        </p:nvPicPr>
+        <p:blipFill>
+          <a:blip r:embed="rId2"/>
+          <a:stretch>
+            <a:fillRect/>
+          </a:stretch>
+        </p:blipFill>
+        <p:spPr>
+          <a:xfrm>
+            <a:off x="1709736" y="5319305"/>
+            <a:ext cx="4352925" cy="3024194"/>
+          </a:xfrm>
+          <a:prstGeom prst="rect">
+            <a:avLst/>
+          </a:prstGeom>
+        </p:spPr>
+      </p:pic>
+    </p:spTree>
+    <p:extLst>
+      <p:ext uri="{BB962C8B-B14F-4D97-AF65-F5344CB8AC3E}">
+        <p14:creationId xmlns:p14="http://schemas.microsoft.com/office/powerpoint/2010/main" val="57126661"/>
+      </p:ext>
+    </p:extLst>
+  </p:cSld>
+  <p:clrMapOvr>
+    <a:masterClrMapping/>
+  </p:clrMapOvr>
+</p:sld>
+</file>
+
+<file path=ppt/slides/slide21.xml><?xml version="1.0" encoding="utf-8"?>
+<p:sld xmlns:a="http://schemas.openxmlformats.org/drawingml/2006/main" xmlns:r="http://schemas.openxmlformats.org/officeDocument/2006/relationships" xmlns:p="http://schemas.openxmlformats.org/presentationml/2006/main">
+  <p:cSld>
+    <p:spTree>
+      <p:nvGrpSpPr>
+        <p:cNvPr id="1" name=""/>
+        <p:cNvGrpSpPr/>
+        <p:nvPr/>
+      </p:nvGrpSpPr>
+      <p:grpSpPr>
+        <a:xfrm>
+          <a:off x="0" y="0"/>
+          <a:ext cx="0" cy="0"/>
+          <a:chOff x="0" y="0"/>
+          <a:chExt cx="0" cy="0"/>
+        </a:xfrm>
+      </p:grpSpPr>
+      <p:sp>
+        <p:nvSpPr>
+          <p:cNvPr id="4" name="Title 3">
+            <a:extLst>
+              <a:ext uri="{FF2B5EF4-FFF2-40B4-BE49-F238E27FC236}">
+                <a16:creationId xmlns:a16="http://schemas.microsoft.com/office/drawing/2014/main" id="{4803E82E-B25A-4A73-94A2-BBE1E2927A43}"/>
+              </a:ext>
+            </a:extLst>
+          </p:cNvPr>
+          <p:cNvSpPr>
+            <a:spLocks noGrp="1"/>
+          </p:cNvSpPr>
+          <p:nvPr>
+            <p:ph type="ctrTitle"/>
+          </p:nvPr>
+        </p:nvSpPr>
+        <p:spPr>
+          <a:xfrm>
+            <a:off x="189071" y="809625"/>
+            <a:ext cx="7394258" cy="742608"/>
+          </a:xfrm>
+        </p:spPr>
+        <p:txBody>
+          <a:bodyPr>
+            <a:normAutofit fontScale="90000"/>
+          </a:bodyPr>
+          <a:lstStyle/>
+          <a:p>
+            <a:r>
+              <a:rPr lang="en-US" dirty="0"/>
+              <a:t>Creating a leaderboard using lists</a:t>
+            </a:r>
+          </a:p>
+        </p:txBody>
+      </p:sp>
+      <p:sp>
+        <p:nvSpPr>
+          <p:cNvPr id="3" name="TextBox 2">
+            <a:extLst>
+              <a:ext uri="{FF2B5EF4-FFF2-40B4-BE49-F238E27FC236}">
+                <a16:creationId xmlns:a16="http://schemas.microsoft.com/office/drawing/2014/main" id="{76E83872-B5AA-FB5D-E6FA-0635C73B3C1C}"/>
+              </a:ext>
+            </a:extLst>
+          </p:cNvPr>
+          <p:cNvSpPr txBox="1"/>
+          <p:nvPr/>
+        </p:nvSpPr>
+        <p:spPr>
+          <a:xfrm>
+            <a:off x="614723" y="1475334"/>
+            <a:ext cx="6685109" cy="2308324"/>
+          </a:xfrm>
+          <a:prstGeom prst="rect">
+            <a:avLst/>
+          </a:prstGeom>
+          <a:noFill/>
+        </p:spPr>
+        <p:txBody>
+          <a:bodyPr wrap="square" rtlCol="0">
+            <a:spAutoFit/>
+          </a:bodyPr>
+          <a:lstStyle/>
+          <a:p>
+            <a:r>
+              <a:rPr lang="en-US" dirty="0"/>
+              <a:t>While scratch is entirely contained to the scope of the code being run once, meaning there is no way to save variables from the project without editing it, we can make use of lists to track scores in a given playthrough of the game.</a:t>
+            </a:r>
+          </a:p>
+          <a:p>
+            <a:endParaRPr lang="en-US" dirty="0"/>
+          </a:p>
+          <a:p>
+            <a:r>
+              <a:rPr lang="en-US" dirty="0"/>
+              <a:t>Lets start by making a list, which is found underneath the variable section. Lets name this list “Leaderboard” and under the stage script, lets start making a code to control it</a:t>
+            </a:r>
+          </a:p>
+        </p:txBody>
+      </p:sp>
+      <p:pic>
+        <p:nvPicPr>
+          <p:cNvPr id="9" name="Picture 8">
+            <a:extLst>
+              <a:ext uri="{FF2B5EF4-FFF2-40B4-BE49-F238E27FC236}">
+                <a16:creationId xmlns:a16="http://schemas.microsoft.com/office/drawing/2014/main" id="{D04C2A27-0692-9F77-B628-97DB1B194457}"/>
+              </a:ext>
+            </a:extLst>
+          </p:cNvPr>
+          <p:cNvPicPr>
+            <a:picLocks noChangeAspect="1"/>
+          </p:cNvPicPr>
+          <p:nvPr/>
+        </p:nvPicPr>
+        <p:blipFill>
+          <a:blip r:embed="rId2"/>
+          <a:stretch>
+            <a:fillRect/>
+          </a:stretch>
+        </p:blipFill>
+        <p:spPr>
+          <a:xfrm>
+            <a:off x="614723" y="3783658"/>
+            <a:ext cx="3135486" cy="2527417"/>
+          </a:xfrm>
+          <a:prstGeom prst="rect">
+            <a:avLst/>
+          </a:prstGeom>
+        </p:spPr>
+      </p:pic>
+      <p:pic>
+        <p:nvPicPr>
+          <p:cNvPr id="11" name="Picture 10">
+            <a:extLst>
+              <a:ext uri="{FF2B5EF4-FFF2-40B4-BE49-F238E27FC236}">
+                <a16:creationId xmlns:a16="http://schemas.microsoft.com/office/drawing/2014/main" id="{E26F0BCA-47A0-7E29-1ABA-3CD6071B8861}"/>
+              </a:ext>
+            </a:extLst>
+          </p:cNvPr>
+          <p:cNvPicPr>
+            <a:picLocks noChangeAspect="1"/>
+          </p:cNvPicPr>
+          <p:nvPr/>
+        </p:nvPicPr>
+        <p:blipFill>
+          <a:blip r:embed="rId3"/>
+          <a:stretch>
+            <a:fillRect/>
+          </a:stretch>
+        </p:blipFill>
+        <p:spPr>
+          <a:xfrm>
+            <a:off x="3886200" y="3933044"/>
+            <a:ext cx="3492393" cy="2341699"/>
+          </a:xfrm>
+          <a:prstGeom prst="rect">
+            <a:avLst/>
+          </a:prstGeom>
+        </p:spPr>
+      </p:pic>
+      <p:cxnSp>
+        <p:nvCxnSpPr>
+          <p:cNvPr id="12" name="Straight Arrow Connector 11">
+            <a:extLst>
+              <a:ext uri="{FF2B5EF4-FFF2-40B4-BE49-F238E27FC236}">
+                <a16:creationId xmlns:a16="http://schemas.microsoft.com/office/drawing/2014/main" id="{16DF1413-D62E-BB26-51A8-6480C18F9DC3}"/>
+              </a:ext>
+            </a:extLst>
+          </p:cNvPr>
+          <p:cNvCxnSpPr>
+            <a:cxnSpLocks/>
+          </p:cNvCxnSpPr>
+          <p:nvPr/>
+        </p:nvCxnSpPr>
+        <p:spPr>
+          <a:xfrm flipV="1">
+            <a:off x="6189488" y="4717997"/>
+            <a:ext cx="687722" cy="868293"/>
+          </a:xfrm>
+          <a:prstGeom prst="straightConnector1">
+            <a:avLst/>
+          </a:prstGeom>
+          <a:ln w="57150">
+            <a:tailEnd type="triangle"/>
+          </a:ln>
+        </p:spPr>
+        <p:style>
+          <a:lnRef idx="1">
+            <a:schemeClr val="accent1"/>
+          </a:lnRef>
+          <a:fillRef idx="0">
+            <a:schemeClr val="accent1"/>
+          </a:fillRef>
+          <a:effectRef idx="0">
+            <a:schemeClr val="accent1"/>
+          </a:effectRef>
+          <a:fontRef idx="minor">
+            <a:schemeClr val="tx1"/>
+          </a:fontRef>
+        </p:style>
+      </p:cxnSp>
+      <p:sp>
+        <p:nvSpPr>
+          <p:cNvPr id="14" name="TextBox 13">
+            <a:extLst>
+              <a:ext uri="{FF2B5EF4-FFF2-40B4-BE49-F238E27FC236}">
+                <a16:creationId xmlns:a16="http://schemas.microsoft.com/office/drawing/2014/main" id="{605C3498-D38C-A145-FBD9-75972D26E943}"/>
+              </a:ext>
+            </a:extLst>
+          </p:cNvPr>
+          <p:cNvSpPr txBox="1"/>
+          <p:nvPr/>
+        </p:nvSpPr>
+        <p:spPr>
+          <a:xfrm>
+            <a:off x="614723" y="6424129"/>
+            <a:ext cx="6685109" cy="1754326"/>
+          </a:xfrm>
+          <a:prstGeom prst="rect">
+            <a:avLst/>
+          </a:prstGeom>
+          <a:noFill/>
+        </p:spPr>
+        <p:txBody>
+          <a:bodyPr wrap="square" rtlCol="0">
+            <a:spAutoFit/>
+          </a:bodyPr>
+          <a:lstStyle/>
+          <a:p>
+            <a:r>
+              <a:rPr lang="en-US" dirty="0"/>
+              <a:t>Lets start by making a code that will ensure the list is clear when the game is first started, and will not be showing initially, but when we get to the losing screen, the list will display all the collected scores. We also want the list to hide when the game is restarted.</a:t>
+            </a:r>
+          </a:p>
+          <a:p>
+            <a:endParaRPr lang="en-US" dirty="0"/>
+          </a:p>
+          <a:p>
+            <a:endParaRPr lang="en-US" dirty="0"/>
+          </a:p>
+        </p:txBody>
+      </p:sp>
+      <p:pic>
+        <p:nvPicPr>
+          <p:cNvPr id="17" name="Picture 16">
+            <a:extLst>
+              <a:ext uri="{FF2B5EF4-FFF2-40B4-BE49-F238E27FC236}">
+                <a16:creationId xmlns:a16="http://schemas.microsoft.com/office/drawing/2014/main" id="{6B5FD537-F629-79B0-C96D-22138BC95282}"/>
+              </a:ext>
+            </a:extLst>
+          </p:cNvPr>
+          <p:cNvPicPr>
+            <a:picLocks noChangeAspect="1"/>
+          </p:cNvPicPr>
+          <p:nvPr/>
+        </p:nvPicPr>
+        <p:blipFill>
+          <a:blip r:embed="rId4"/>
+          <a:stretch>
+            <a:fillRect/>
+          </a:stretch>
+        </p:blipFill>
+        <p:spPr>
+          <a:xfrm>
+            <a:off x="1951744" y="7685016"/>
+            <a:ext cx="4145535" cy="2219327"/>
+          </a:xfrm>
+          <a:prstGeom prst="rect">
+            <a:avLst/>
+          </a:prstGeom>
+        </p:spPr>
+      </p:pic>
+    </p:spTree>
+    <p:extLst>
+      <p:ext uri="{BB962C8B-B14F-4D97-AF65-F5344CB8AC3E}">
+        <p14:creationId xmlns:p14="http://schemas.microsoft.com/office/powerpoint/2010/main" val="2298921591"/>
+      </p:ext>
+    </p:extLst>
+  </p:cSld>
+  <p:clrMapOvr>
+    <a:masterClrMapping/>
+  </p:clrMapOvr>
+</p:sld>
+</file>
+
+<file path=ppt/slides/slide22.xml><?xml version="1.0" encoding="utf-8"?>
+<p:sld xmlns:a="http://schemas.openxmlformats.org/drawingml/2006/main" xmlns:r="http://schemas.openxmlformats.org/officeDocument/2006/relationships" xmlns:p="http://schemas.openxmlformats.org/presentationml/2006/main">
+  <p:cSld>
+    <p:spTree>
+      <p:nvGrpSpPr>
+        <p:cNvPr id="1" name=""/>
+        <p:cNvGrpSpPr/>
+        <p:nvPr/>
+      </p:nvGrpSpPr>
+      <p:grpSpPr>
+        <a:xfrm>
+          <a:off x="0" y="0"/>
+          <a:ext cx="0" cy="0"/>
+          <a:chOff x="0" y="0"/>
+          <a:chExt cx="0" cy="0"/>
+        </a:xfrm>
+      </p:grpSpPr>
+      <p:sp>
+        <p:nvSpPr>
+          <p:cNvPr id="4" name="Title 3">
+            <a:extLst>
+              <a:ext uri="{FF2B5EF4-FFF2-40B4-BE49-F238E27FC236}">
+                <a16:creationId xmlns:a16="http://schemas.microsoft.com/office/drawing/2014/main" id="{4803E82E-B25A-4A73-94A2-BBE1E2927A43}"/>
+              </a:ext>
+            </a:extLst>
+          </p:cNvPr>
+          <p:cNvSpPr>
+            <a:spLocks noGrp="1"/>
+          </p:cNvSpPr>
+          <p:nvPr>
+            <p:ph type="ctrTitle"/>
+          </p:nvPr>
+        </p:nvSpPr>
+        <p:spPr>
+          <a:xfrm>
+            <a:off x="189071" y="809625"/>
+            <a:ext cx="7394258" cy="742608"/>
+          </a:xfrm>
+        </p:spPr>
+        <p:txBody>
+          <a:bodyPr>
+            <a:normAutofit fontScale="90000"/>
+          </a:bodyPr>
+          <a:lstStyle/>
+          <a:p>
+            <a:r>
+              <a:rPr lang="en-US" dirty="0"/>
+              <a:t>Creating a leaderboard using lists</a:t>
+            </a:r>
+          </a:p>
+        </p:txBody>
+      </p:sp>
+      <p:sp>
+        <p:nvSpPr>
+          <p:cNvPr id="2" name="TextBox 1">
+            <a:extLst>
+              <a:ext uri="{FF2B5EF4-FFF2-40B4-BE49-F238E27FC236}">
+                <a16:creationId xmlns:a16="http://schemas.microsoft.com/office/drawing/2014/main" id="{07875437-E052-9FA1-B008-5F48F11901DE}"/>
+              </a:ext>
+            </a:extLst>
+          </p:cNvPr>
+          <p:cNvSpPr txBox="1"/>
+          <p:nvPr/>
+        </p:nvSpPr>
+        <p:spPr>
+          <a:xfrm>
+            <a:off x="614723" y="1683101"/>
+            <a:ext cx="6685109" cy="5078313"/>
+          </a:xfrm>
+          <a:prstGeom prst="rect">
+            <a:avLst/>
+          </a:prstGeom>
+          <a:noFill/>
+        </p:spPr>
+        <p:txBody>
+          <a:bodyPr wrap="square" rtlCol="0">
+            <a:spAutoFit/>
+          </a:bodyPr>
+          <a:lstStyle/>
+          <a:p>
+            <a:r>
+              <a:rPr lang="en-US" dirty="0"/>
+              <a:t>Now that we have a list that hides and shows itself when we want, lets make the list store values. To add to lists we would use the “add item to list” block:</a:t>
+            </a:r>
+          </a:p>
+          <a:p>
+            <a:endParaRPr lang="en-US" dirty="0"/>
+          </a:p>
+          <a:p>
+            <a:endParaRPr lang="en-US" dirty="0"/>
+          </a:p>
+          <a:p>
+            <a:endParaRPr lang="en-US" dirty="0"/>
+          </a:p>
+          <a:p>
+            <a:endParaRPr lang="en-US" dirty="0"/>
+          </a:p>
+          <a:p>
+            <a:endParaRPr lang="en-US" dirty="0"/>
+          </a:p>
+          <a:p>
+            <a:endParaRPr lang="en-US" dirty="0"/>
+          </a:p>
+          <a:p>
+            <a:endParaRPr lang="en-US" dirty="0"/>
+          </a:p>
+          <a:p>
+            <a:endParaRPr lang="en-US" dirty="0"/>
+          </a:p>
+          <a:p>
+            <a:r>
+              <a:rPr lang="en-US" dirty="0"/>
+              <a:t>but we want to sort the order of the list by the order of scores received. To do this, we need go through every item of the list and compare values until we find where the score to be added should be located. We can do this looking from the bottom of the list up, or from the top down. To do this, we need to store a variable to count how far into the list we are, and then insert the value in the list at that point when it is found.</a:t>
+            </a:r>
+          </a:p>
+        </p:txBody>
+      </p:sp>
+      <p:pic>
+        <p:nvPicPr>
+          <p:cNvPr id="6" name="Picture 5">
+            <a:extLst>
+              <a:ext uri="{FF2B5EF4-FFF2-40B4-BE49-F238E27FC236}">
+                <a16:creationId xmlns:a16="http://schemas.microsoft.com/office/drawing/2014/main" id="{EA0876B7-40B0-12E6-CC7B-BF5ABCC74149}"/>
+              </a:ext>
+            </a:extLst>
+          </p:cNvPr>
+          <p:cNvPicPr>
+            <a:picLocks noChangeAspect="1"/>
+          </p:cNvPicPr>
+          <p:nvPr/>
+        </p:nvPicPr>
+        <p:blipFill>
+          <a:blip r:embed="rId2"/>
+          <a:stretch>
+            <a:fillRect/>
+          </a:stretch>
+        </p:blipFill>
+        <p:spPr>
+          <a:xfrm>
+            <a:off x="2864601" y="2297646"/>
+            <a:ext cx="2043197" cy="2374247"/>
+          </a:xfrm>
+          <a:prstGeom prst="rect">
+            <a:avLst/>
+          </a:prstGeom>
+        </p:spPr>
+      </p:pic>
+      <p:cxnSp>
+        <p:nvCxnSpPr>
+          <p:cNvPr id="8" name="Straight Connector 7">
+            <a:extLst>
+              <a:ext uri="{FF2B5EF4-FFF2-40B4-BE49-F238E27FC236}">
+                <a16:creationId xmlns:a16="http://schemas.microsoft.com/office/drawing/2014/main" id="{FE74B803-69A3-6BEF-B8C1-C3F93E81C5B7}"/>
+              </a:ext>
+            </a:extLst>
+          </p:cNvPr>
+          <p:cNvCxnSpPr/>
+          <p:nvPr/>
+        </p:nvCxnSpPr>
+        <p:spPr>
+          <a:xfrm>
+            <a:off x="1644383" y="7645611"/>
+            <a:ext cx="1490703" cy="0"/>
+          </a:xfrm>
+          <a:prstGeom prst="line">
+            <a:avLst/>
+          </a:prstGeom>
+          <a:ln w="57150"/>
+        </p:spPr>
+        <p:style>
+          <a:lnRef idx="1">
+            <a:schemeClr val="accent1"/>
+          </a:lnRef>
+          <a:fillRef idx="0">
+            <a:schemeClr val="accent1"/>
+          </a:fillRef>
+          <a:effectRef idx="0">
+            <a:schemeClr val="accent1"/>
+          </a:effectRef>
+          <a:fontRef idx="minor">
+            <a:schemeClr val="tx1"/>
+          </a:fontRef>
+        </p:style>
+      </p:cxnSp>
+      <p:cxnSp>
+        <p:nvCxnSpPr>
+          <p:cNvPr id="10" name="Straight Connector 9">
+            <a:extLst>
+              <a:ext uri="{FF2B5EF4-FFF2-40B4-BE49-F238E27FC236}">
+                <a16:creationId xmlns:a16="http://schemas.microsoft.com/office/drawing/2014/main" id="{96112698-390D-9861-145D-99111DF6D52B}"/>
+              </a:ext>
+            </a:extLst>
+          </p:cNvPr>
+          <p:cNvCxnSpPr/>
+          <p:nvPr/>
+        </p:nvCxnSpPr>
+        <p:spPr>
+          <a:xfrm>
+            <a:off x="1644383" y="8036216"/>
+            <a:ext cx="1490703" cy="0"/>
+          </a:xfrm>
+          <a:prstGeom prst="line">
+            <a:avLst/>
+          </a:prstGeom>
+          <a:ln w="57150"/>
+        </p:spPr>
+        <p:style>
+          <a:lnRef idx="1">
+            <a:schemeClr val="accent1"/>
+          </a:lnRef>
+          <a:fillRef idx="0">
+            <a:schemeClr val="accent1"/>
+          </a:fillRef>
+          <a:effectRef idx="0">
+            <a:schemeClr val="accent1"/>
+          </a:effectRef>
+          <a:fontRef idx="minor">
+            <a:schemeClr val="tx1"/>
+          </a:fontRef>
+        </p:style>
+      </p:cxnSp>
+      <p:cxnSp>
+        <p:nvCxnSpPr>
+          <p:cNvPr id="13" name="Straight Connector 12">
+            <a:extLst>
+              <a:ext uri="{FF2B5EF4-FFF2-40B4-BE49-F238E27FC236}">
+                <a16:creationId xmlns:a16="http://schemas.microsoft.com/office/drawing/2014/main" id="{10FE2149-66B1-4D5D-94AA-76AE22CBB119}"/>
+              </a:ext>
+            </a:extLst>
+          </p:cNvPr>
+          <p:cNvCxnSpPr/>
+          <p:nvPr/>
+        </p:nvCxnSpPr>
+        <p:spPr>
+          <a:xfrm>
+            <a:off x="1644383" y="8458838"/>
+            <a:ext cx="1490703" cy="0"/>
+          </a:xfrm>
+          <a:prstGeom prst="line">
+            <a:avLst/>
+          </a:prstGeom>
+          <a:ln w="57150"/>
+        </p:spPr>
+        <p:style>
+          <a:lnRef idx="1">
+            <a:schemeClr val="accent1"/>
+          </a:lnRef>
+          <a:fillRef idx="0">
+            <a:schemeClr val="accent1"/>
+          </a:fillRef>
+          <a:effectRef idx="0">
+            <a:schemeClr val="accent1"/>
+          </a:effectRef>
+          <a:fontRef idx="minor">
+            <a:schemeClr val="tx1"/>
+          </a:fontRef>
+        </p:style>
+      </p:cxnSp>
+      <p:cxnSp>
+        <p:nvCxnSpPr>
+          <p:cNvPr id="15" name="Straight Connector 14">
+            <a:extLst>
+              <a:ext uri="{FF2B5EF4-FFF2-40B4-BE49-F238E27FC236}">
+                <a16:creationId xmlns:a16="http://schemas.microsoft.com/office/drawing/2014/main" id="{020D5AE4-ED97-93F9-B9C4-352C7A6229D8}"/>
+              </a:ext>
+            </a:extLst>
+          </p:cNvPr>
+          <p:cNvCxnSpPr/>
+          <p:nvPr/>
+        </p:nvCxnSpPr>
+        <p:spPr>
+          <a:xfrm>
+            <a:off x="1644383" y="8849443"/>
+            <a:ext cx="1490703" cy="0"/>
+          </a:xfrm>
+          <a:prstGeom prst="line">
+            <a:avLst/>
+          </a:prstGeom>
+          <a:ln w="57150"/>
+        </p:spPr>
+        <p:style>
+          <a:lnRef idx="1">
+            <a:schemeClr val="accent1"/>
+          </a:lnRef>
+          <a:fillRef idx="0">
+            <a:schemeClr val="accent1"/>
+          </a:fillRef>
+          <a:effectRef idx="0">
+            <a:schemeClr val="accent1"/>
+          </a:effectRef>
+          <a:fontRef idx="minor">
+            <a:schemeClr val="tx1"/>
+          </a:fontRef>
+        </p:style>
+      </p:cxnSp>
+      <p:cxnSp>
+        <p:nvCxnSpPr>
+          <p:cNvPr id="16" name="Straight Connector 15">
+            <a:extLst>
+              <a:ext uri="{FF2B5EF4-FFF2-40B4-BE49-F238E27FC236}">
+                <a16:creationId xmlns:a16="http://schemas.microsoft.com/office/drawing/2014/main" id="{B0AC2635-B35F-8166-D76B-CDFBEAE3098C}"/>
+              </a:ext>
+            </a:extLst>
+          </p:cNvPr>
+          <p:cNvCxnSpPr/>
+          <p:nvPr/>
+        </p:nvCxnSpPr>
+        <p:spPr>
+          <a:xfrm>
+            <a:off x="1644383" y="9249012"/>
+            <a:ext cx="1490703" cy="0"/>
+          </a:xfrm>
+          <a:prstGeom prst="line">
+            <a:avLst/>
+          </a:prstGeom>
+          <a:ln w="57150"/>
+        </p:spPr>
+        <p:style>
+          <a:lnRef idx="1">
+            <a:schemeClr val="accent1"/>
+          </a:lnRef>
+          <a:fillRef idx="0">
+            <a:schemeClr val="accent1"/>
+          </a:fillRef>
+          <a:effectRef idx="0">
+            <a:schemeClr val="accent1"/>
+          </a:effectRef>
+          <a:fontRef idx="minor">
+            <a:schemeClr val="tx1"/>
+          </a:fontRef>
+        </p:style>
+      </p:cxnSp>
+      <p:cxnSp>
+        <p:nvCxnSpPr>
+          <p:cNvPr id="18" name="Straight Connector 17">
+            <a:extLst>
+              <a:ext uri="{FF2B5EF4-FFF2-40B4-BE49-F238E27FC236}">
+                <a16:creationId xmlns:a16="http://schemas.microsoft.com/office/drawing/2014/main" id="{A52E2207-0788-E199-E88D-86104137522F}"/>
+              </a:ext>
+            </a:extLst>
+          </p:cNvPr>
+          <p:cNvCxnSpPr/>
+          <p:nvPr/>
+        </p:nvCxnSpPr>
+        <p:spPr>
+          <a:xfrm>
+            <a:off x="1644383" y="9639617"/>
+            <a:ext cx="1490703" cy="0"/>
+          </a:xfrm>
+          <a:prstGeom prst="line">
+            <a:avLst/>
+          </a:prstGeom>
+          <a:ln w="57150"/>
+        </p:spPr>
+        <p:style>
+          <a:lnRef idx="1">
+            <a:schemeClr val="accent1"/>
+          </a:lnRef>
+          <a:fillRef idx="0">
+            <a:schemeClr val="accent1"/>
+          </a:fillRef>
+          <a:effectRef idx="0">
+            <a:schemeClr val="accent1"/>
+          </a:effectRef>
+          <a:fontRef idx="minor">
+            <a:schemeClr val="tx1"/>
+          </a:fontRef>
+        </p:style>
+      </p:cxnSp>
+      <p:cxnSp>
+        <p:nvCxnSpPr>
+          <p:cNvPr id="19" name="Straight Connector 18">
+            <a:extLst>
+              <a:ext uri="{FF2B5EF4-FFF2-40B4-BE49-F238E27FC236}">
+                <a16:creationId xmlns:a16="http://schemas.microsoft.com/office/drawing/2014/main" id="{10A3E63F-CF44-61D0-9D7C-0982D6E0C3D0}"/>
+              </a:ext>
+            </a:extLst>
+          </p:cNvPr>
+          <p:cNvCxnSpPr/>
+          <p:nvPr/>
+        </p:nvCxnSpPr>
+        <p:spPr>
+          <a:xfrm>
+            <a:off x="4970289" y="8458838"/>
+            <a:ext cx="1490703" cy="0"/>
+          </a:xfrm>
+          <a:prstGeom prst="line">
+            <a:avLst/>
+          </a:prstGeom>
+          <a:ln w="57150"/>
+        </p:spPr>
+        <p:style>
+          <a:lnRef idx="1">
+            <a:schemeClr val="accent1"/>
+          </a:lnRef>
+          <a:fillRef idx="0">
+            <a:schemeClr val="accent1"/>
+          </a:fillRef>
+          <a:effectRef idx="0">
+            <a:schemeClr val="accent1"/>
+          </a:effectRef>
+          <a:fontRef idx="minor">
+            <a:schemeClr val="tx1"/>
+          </a:fontRef>
+        </p:style>
+      </p:cxnSp>
+      <p:sp>
+        <p:nvSpPr>
+          <p:cNvPr id="20" name="TextBox 19">
+            <a:extLst>
+              <a:ext uri="{FF2B5EF4-FFF2-40B4-BE49-F238E27FC236}">
+                <a16:creationId xmlns:a16="http://schemas.microsoft.com/office/drawing/2014/main" id="{1F4DC259-081C-0761-9577-540101D4F0A4}"/>
+              </a:ext>
+            </a:extLst>
+          </p:cNvPr>
+          <p:cNvSpPr txBox="1"/>
+          <p:nvPr/>
+        </p:nvSpPr>
+        <p:spPr>
+          <a:xfrm>
+            <a:off x="1644383" y="7070341"/>
+            <a:ext cx="1913324" cy="369332"/>
+          </a:xfrm>
+          <a:prstGeom prst="rect">
+            <a:avLst/>
+          </a:prstGeom>
+          <a:noFill/>
+        </p:spPr>
+        <p:txBody>
+          <a:bodyPr wrap="square" rtlCol="0">
+            <a:spAutoFit/>
+          </a:bodyPr>
+          <a:lstStyle/>
+          <a:p>
+            <a:r>
+              <a:rPr lang="en-US" dirty="0"/>
+              <a:t>Current List</a:t>
+            </a:r>
+          </a:p>
+        </p:txBody>
+      </p:sp>
+      <p:sp>
+        <p:nvSpPr>
+          <p:cNvPr id="21" name="TextBox 20">
+            <a:extLst>
+              <a:ext uri="{FF2B5EF4-FFF2-40B4-BE49-F238E27FC236}">
+                <a16:creationId xmlns:a16="http://schemas.microsoft.com/office/drawing/2014/main" id="{17D7BD4D-F08C-9298-0E81-DD250CB07358}"/>
+              </a:ext>
+            </a:extLst>
+          </p:cNvPr>
+          <p:cNvSpPr txBox="1"/>
+          <p:nvPr/>
+        </p:nvSpPr>
+        <p:spPr>
+          <a:xfrm>
+            <a:off x="4970289" y="8005967"/>
+            <a:ext cx="1913324" cy="369332"/>
+          </a:xfrm>
+          <a:prstGeom prst="rect">
+            <a:avLst/>
+          </a:prstGeom>
+          <a:noFill/>
+        </p:spPr>
+        <p:txBody>
+          <a:bodyPr wrap="square" rtlCol="0">
+            <a:spAutoFit/>
+          </a:bodyPr>
+          <a:lstStyle/>
+          <a:p>
+            <a:r>
+              <a:rPr lang="en-US" dirty="0"/>
+              <a:t>New Value (5)</a:t>
+            </a:r>
+          </a:p>
+        </p:txBody>
+      </p:sp>
+      <p:sp>
+        <p:nvSpPr>
+          <p:cNvPr id="22" name="TextBox 21">
+            <a:extLst>
+              <a:ext uri="{FF2B5EF4-FFF2-40B4-BE49-F238E27FC236}">
+                <a16:creationId xmlns:a16="http://schemas.microsoft.com/office/drawing/2014/main" id="{C672324D-7C10-673B-EF02-E14563A2D603}"/>
+              </a:ext>
+            </a:extLst>
+          </p:cNvPr>
+          <p:cNvSpPr txBox="1"/>
+          <p:nvPr/>
+        </p:nvSpPr>
+        <p:spPr>
+          <a:xfrm>
+            <a:off x="3293888" y="9412069"/>
+            <a:ext cx="4067415" cy="646331"/>
+          </a:xfrm>
+          <a:prstGeom prst="rect">
+            <a:avLst/>
+          </a:prstGeom>
+          <a:noFill/>
+        </p:spPr>
+        <p:txBody>
+          <a:bodyPr wrap="square" rtlCol="0">
+            <a:spAutoFit/>
+          </a:bodyPr>
+          <a:lstStyle/>
+          <a:p>
+            <a:r>
+              <a:rPr lang="en-US" dirty="0"/>
+              <a:t>Check starting from bottom to see if the new value is less than the list item</a:t>
+            </a:r>
+          </a:p>
+        </p:txBody>
+      </p:sp>
+      <p:cxnSp>
+        <p:nvCxnSpPr>
+          <p:cNvPr id="24" name="Straight Arrow Connector 23">
+            <a:extLst>
+              <a:ext uri="{FF2B5EF4-FFF2-40B4-BE49-F238E27FC236}">
+                <a16:creationId xmlns:a16="http://schemas.microsoft.com/office/drawing/2014/main" id="{E23B346D-9231-60F5-EE26-C734A54963B9}"/>
+              </a:ext>
+            </a:extLst>
+          </p:cNvPr>
+          <p:cNvCxnSpPr/>
+          <p:nvPr/>
+        </p:nvCxnSpPr>
+        <p:spPr>
+          <a:xfrm flipV="1">
+            <a:off x="3488551" y="8286839"/>
+            <a:ext cx="0" cy="1125208"/>
+          </a:xfrm>
+          <a:prstGeom prst="straightConnector1">
+            <a:avLst/>
+          </a:prstGeom>
+          <a:ln w="38100">
+            <a:tailEnd type="triangle"/>
+          </a:ln>
+        </p:spPr>
+        <p:style>
+          <a:lnRef idx="1">
+            <a:schemeClr val="accent1"/>
+          </a:lnRef>
+          <a:fillRef idx="0">
+            <a:schemeClr val="accent1"/>
+          </a:fillRef>
+          <a:effectRef idx="0">
+            <a:schemeClr val="accent1"/>
+          </a:effectRef>
+          <a:fontRef idx="minor">
+            <a:schemeClr val="tx1"/>
+          </a:fontRef>
+        </p:style>
+      </p:cxnSp>
+      <p:cxnSp>
+        <p:nvCxnSpPr>
+          <p:cNvPr id="25" name="Straight Arrow Connector 24">
+            <a:extLst>
+              <a:ext uri="{FF2B5EF4-FFF2-40B4-BE49-F238E27FC236}">
+                <a16:creationId xmlns:a16="http://schemas.microsoft.com/office/drawing/2014/main" id="{9D383F82-6FF7-5FAC-CB8B-50428F3F84F1}"/>
+              </a:ext>
+            </a:extLst>
+          </p:cNvPr>
+          <p:cNvCxnSpPr>
+            <a:cxnSpLocks/>
+          </p:cNvCxnSpPr>
+          <p:nvPr/>
+        </p:nvCxnSpPr>
+        <p:spPr>
+          <a:xfrm flipH="1">
+            <a:off x="3387378" y="7484814"/>
+            <a:ext cx="815788" cy="411420"/>
+          </a:xfrm>
+          <a:prstGeom prst="straightConnector1">
+            <a:avLst/>
+          </a:prstGeom>
+          <a:ln w="38100">
+            <a:tailEnd type="triangle"/>
+          </a:ln>
+        </p:spPr>
+        <p:style>
+          <a:lnRef idx="1">
+            <a:schemeClr val="accent1"/>
+          </a:lnRef>
+          <a:fillRef idx="0">
+            <a:schemeClr val="accent1"/>
+          </a:fillRef>
+          <a:effectRef idx="0">
+            <a:schemeClr val="accent1"/>
+          </a:effectRef>
+          <a:fontRef idx="minor">
+            <a:schemeClr val="tx1"/>
+          </a:fontRef>
+        </p:style>
+      </p:cxnSp>
+      <p:sp>
+        <p:nvSpPr>
+          <p:cNvPr id="27" name="TextBox 26">
+            <a:extLst>
+              <a:ext uri="{FF2B5EF4-FFF2-40B4-BE49-F238E27FC236}">
+                <a16:creationId xmlns:a16="http://schemas.microsoft.com/office/drawing/2014/main" id="{68D936BA-F210-3E3B-A445-A19D4BF9F62C}"/>
+              </a:ext>
+            </a:extLst>
+          </p:cNvPr>
+          <p:cNvSpPr txBox="1"/>
+          <p:nvPr/>
+        </p:nvSpPr>
+        <p:spPr>
+          <a:xfrm>
+            <a:off x="4117361" y="6902241"/>
+            <a:ext cx="3619180" cy="646331"/>
+          </a:xfrm>
+          <a:prstGeom prst="rect">
+            <a:avLst/>
+          </a:prstGeom>
+          <a:noFill/>
+        </p:spPr>
+        <p:txBody>
+          <a:bodyPr wrap="square" rtlCol="0">
+            <a:spAutoFit/>
+          </a:bodyPr>
+          <a:lstStyle/>
+          <a:p>
+            <a:r>
+              <a:rPr lang="en-US" dirty="0"/>
+              <a:t>Inserting new value where new value is less than the list value</a:t>
+            </a:r>
+          </a:p>
+        </p:txBody>
+      </p:sp>
+      <p:sp>
+        <p:nvSpPr>
+          <p:cNvPr id="30" name="TextBox 29">
+            <a:extLst>
+              <a:ext uri="{FF2B5EF4-FFF2-40B4-BE49-F238E27FC236}">
+                <a16:creationId xmlns:a16="http://schemas.microsoft.com/office/drawing/2014/main" id="{F118821A-3F6B-84EF-448D-BB9C8B2C7239}"/>
+              </a:ext>
+            </a:extLst>
+          </p:cNvPr>
+          <p:cNvSpPr txBox="1"/>
+          <p:nvPr/>
+        </p:nvSpPr>
+        <p:spPr>
+          <a:xfrm>
+            <a:off x="189071" y="9412047"/>
+            <a:ext cx="1913324" cy="369332"/>
+          </a:xfrm>
+          <a:prstGeom prst="rect">
+            <a:avLst/>
+          </a:prstGeom>
+          <a:noFill/>
+        </p:spPr>
+        <p:txBody>
+          <a:bodyPr wrap="square" rtlCol="0">
+            <a:spAutoFit/>
+          </a:bodyPr>
+          <a:lstStyle/>
+          <a:p>
+            <a:r>
+              <a:rPr lang="en-US" dirty="0"/>
+              <a:t>List Value (1)</a:t>
+            </a:r>
+          </a:p>
+        </p:txBody>
+      </p:sp>
+      <p:sp>
+        <p:nvSpPr>
+          <p:cNvPr id="31" name="TextBox 30">
+            <a:extLst>
+              <a:ext uri="{FF2B5EF4-FFF2-40B4-BE49-F238E27FC236}">
+                <a16:creationId xmlns:a16="http://schemas.microsoft.com/office/drawing/2014/main" id="{B6862FA7-F8A1-8DF8-97AE-06B02896616E}"/>
+              </a:ext>
+            </a:extLst>
+          </p:cNvPr>
+          <p:cNvSpPr txBox="1"/>
+          <p:nvPr/>
+        </p:nvSpPr>
+        <p:spPr>
+          <a:xfrm>
+            <a:off x="189071" y="9091737"/>
+            <a:ext cx="1913324" cy="369332"/>
+          </a:xfrm>
+          <a:prstGeom prst="rect">
+            <a:avLst/>
+          </a:prstGeom>
+          <a:noFill/>
+        </p:spPr>
+        <p:txBody>
+          <a:bodyPr wrap="square" rtlCol="0">
+            <a:spAutoFit/>
+          </a:bodyPr>
+          <a:lstStyle/>
+          <a:p>
+            <a:r>
+              <a:rPr lang="en-US" dirty="0"/>
+              <a:t>List Value (2)</a:t>
+            </a:r>
+          </a:p>
+        </p:txBody>
+      </p:sp>
+      <p:sp>
+        <p:nvSpPr>
+          <p:cNvPr id="32" name="TextBox 31">
+            <a:extLst>
+              <a:ext uri="{FF2B5EF4-FFF2-40B4-BE49-F238E27FC236}">
+                <a16:creationId xmlns:a16="http://schemas.microsoft.com/office/drawing/2014/main" id="{90711D58-75E9-FAF6-75C9-4715EB705441}"/>
+              </a:ext>
+            </a:extLst>
+          </p:cNvPr>
+          <p:cNvSpPr txBox="1"/>
+          <p:nvPr/>
+        </p:nvSpPr>
+        <p:spPr>
+          <a:xfrm>
+            <a:off x="189071" y="8704972"/>
+            <a:ext cx="1913324" cy="369332"/>
+          </a:xfrm>
+          <a:prstGeom prst="rect">
+            <a:avLst/>
+          </a:prstGeom>
+          <a:noFill/>
+        </p:spPr>
+        <p:txBody>
+          <a:bodyPr wrap="square" rtlCol="0">
+            <a:spAutoFit/>
+          </a:bodyPr>
+          <a:lstStyle/>
+          <a:p>
+            <a:r>
+              <a:rPr lang="en-US" dirty="0"/>
+              <a:t>List Value (3)</a:t>
+            </a:r>
+          </a:p>
+        </p:txBody>
+      </p:sp>
+      <p:sp>
+        <p:nvSpPr>
+          <p:cNvPr id="33" name="TextBox 32">
+            <a:extLst>
+              <a:ext uri="{FF2B5EF4-FFF2-40B4-BE49-F238E27FC236}">
+                <a16:creationId xmlns:a16="http://schemas.microsoft.com/office/drawing/2014/main" id="{424E0719-E932-059B-EF95-3D0B480840FF}"/>
+              </a:ext>
+            </a:extLst>
+          </p:cNvPr>
+          <p:cNvSpPr txBox="1"/>
+          <p:nvPr/>
+        </p:nvSpPr>
+        <p:spPr>
+          <a:xfrm>
+            <a:off x="189071" y="8311805"/>
+            <a:ext cx="1913324" cy="369332"/>
+          </a:xfrm>
+          <a:prstGeom prst="rect">
+            <a:avLst/>
+          </a:prstGeom>
+          <a:noFill/>
+        </p:spPr>
+        <p:txBody>
+          <a:bodyPr wrap="square" rtlCol="0">
+            <a:spAutoFit/>
+          </a:bodyPr>
+          <a:lstStyle/>
+          <a:p>
+            <a:r>
+              <a:rPr lang="en-US" dirty="0"/>
+              <a:t>List Value (3)</a:t>
+            </a:r>
+          </a:p>
+        </p:txBody>
+      </p:sp>
+      <p:sp>
+        <p:nvSpPr>
+          <p:cNvPr id="34" name="TextBox 33">
+            <a:extLst>
+              <a:ext uri="{FF2B5EF4-FFF2-40B4-BE49-F238E27FC236}">
+                <a16:creationId xmlns:a16="http://schemas.microsoft.com/office/drawing/2014/main" id="{7296E875-A71E-EE53-C850-0B436AB06FC8}"/>
+              </a:ext>
+            </a:extLst>
+          </p:cNvPr>
+          <p:cNvSpPr txBox="1"/>
+          <p:nvPr/>
+        </p:nvSpPr>
+        <p:spPr>
+          <a:xfrm>
+            <a:off x="189071" y="7873182"/>
+            <a:ext cx="1913324" cy="369332"/>
+          </a:xfrm>
+          <a:prstGeom prst="rect">
+            <a:avLst/>
+          </a:prstGeom>
+          <a:noFill/>
+        </p:spPr>
+        <p:txBody>
+          <a:bodyPr wrap="square" rtlCol="0">
+            <a:spAutoFit/>
+          </a:bodyPr>
+          <a:lstStyle/>
+          <a:p>
+            <a:r>
+              <a:rPr lang="en-US" dirty="0"/>
+              <a:t>List Value (4)</a:t>
+            </a:r>
+          </a:p>
+        </p:txBody>
+      </p:sp>
+      <p:sp>
+        <p:nvSpPr>
+          <p:cNvPr id="35" name="TextBox 34">
+            <a:extLst>
+              <a:ext uri="{FF2B5EF4-FFF2-40B4-BE49-F238E27FC236}">
+                <a16:creationId xmlns:a16="http://schemas.microsoft.com/office/drawing/2014/main" id="{E264D84D-D858-6785-2DF3-5F24DC7E611D}"/>
+              </a:ext>
+            </a:extLst>
+          </p:cNvPr>
+          <p:cNvSpPr txBox="1"/>
+          <p:nvPr/>
+        </p:nvSpPr>
+        <p:spPr>
+          <a:xfrm>
+            <a:off x="189071" y="7488305"/>
+            <a:ext cx="1913324" cy="369332"/>
+          </a:xfrm>
+          <a:prstGeom prst="rect">
+            <a:avLst/>
+          </a:prstGeom>
+          <a:noFill/>
+        </p:spPr>
+        <p:txBody>
+          <a:bodyPr wrap="square" rtlCol="0">
+            <a:spAutoFit/>
+          </a:bodyPr>
+          <a:lstStyle/>
+          <a:p>
+            <a:r>
+              <a:rPr lang="en-US" dirty="0"/>
+              <a:t>List Value (7)</a:t>
+            </a:r>
+          </a:p>
+        </p:txBody>
+      </p:sp>
+    </p:spTree>
+    <p:extLst>
+      <p:ext uri="{BB962C8B-B14F-4D97-AF65-F5344CB8AC3E}">
+        <p14:creationId xmlns:p14="http://schemas.microsoft.com/office/powerpoint/2010/main" val="2837851632"/>
+      </p:ext>
+    </p:extLst>
+  </p:cSld>
+  <p:clrMapOvr>
+    <a:masterClrMapping/>
+  </p:clrMapOvr>
+</p:sld>
+</file>
+
+<file path=ppt/slides/slide23.xml><?xml version="1.0" encoding="utf-8"?>
+<p:sld xmlns:a="http://schemas.openxmlformats.org/drawingml/2006/main" xmlns:r="http://schemas.openxmlformats.org/officeDocument/2006/relationships" xmlns:p="http://schemas.openxmlformats.org/presentationml/2006/main">
+  <p:cSld>
+    <p:spTree>
+      <p:nvGrpSpPr>
+        <p:cNvPr id="1" name=""/>
+        <p:cNvGrpSpPr/>
+        <p:nvPr/>
+      </p:nvGrpSpPr>
+      <p:grpSpPr>
+        <a:xfrm>
+          <a:off x="0" y="0"/>
+          <a:ext cx="0" cy="0"/>
+          <a:chOff x="0" y="0"/>
+          <a:chExt cx="0" cy="0"/>
+        </a:xfrm>
+      </p:grpSpPr>
+      <p:sp>
+        <p:nvSpPr>
+          <p:cNvPr id="4" name="Title 3">
+            <a:extLst>
+              <a:ext uri="{FF2B5EF4-FFF2-40B4-BE49-F238E27FC236}">
+                <a16:creationId xmlns:a16="http://schemas.microsoft.com/office/drawing/2014/main" id="{4803E82E-B25A-4A73-94A2-BBE1E2927A43}"/>
+              </a:ext>
+            </a:extLst>
+          </p:cNvPr>
+          <p:cNvSpPr>
+            <a:spLocks noGrp="1"/>
+          </p:cNvSpPr>
+          <p:nvPr>
+            <p:ph type="ctrTitle"/>
+          </p:nvPr>
+        </p:nvSpPr>
+        <p:spPr>
+          <a:xfrm>
+            <a:off x="189071" y="809625"/>
+            <a:ext cx="7394258" cy="742608"/>
+          </a:xfrm>
+        </p:spPr>
+        <p:txBody>
+          <a:bodyPr>
+            <a:normAutofit fontScale="90000"/>
+          </a:bodyPr>
+          <a:lstStyle/>
+          <a:p>
+            <a:r>
+              <a:rPr lang="en-US" dirty="0"/>
+              <a:t>Creating a leaderboard using lists</a:t>
+            </a:r>
+          </a:p>
+        </p:txBody>
+      </p:sp>
+      <p:sp>
+        <p:nvSpPr>
+          <p:cNvPr id="3" name="TextBox 2">
+            <a:extLst>
+              <a:ext uri="{FF2B5EF4-FFF2-40B4-BE49-F238E27FC236}">
+                <a16:creationId xmlns:a16="http://schemas.microsoft.com/office/drawing/2014/main" id="{F08952E6-8944-6E4A-FB57-AA84F0659CA5}"/>
+              </a:ext>
+            </a:extLst>
+          </p:cNvPr>
+          <p:cNvSpPr txBox="1"/>
+          <p:nvPr/>
+        </p:nvSpPr>
+        <p:spPr>
+          <a:xfrm>
+            <a:off x="365803" y="1702903"/>
+            <a:ext cx="7217525" cy="646331"/>
+          </a:xfrm>
+          <a:prstGeom prst="rect">
+            <a:avLst/>
+          </a:prstGeom>
+          <a:noFill/>
+        </p:spPr>
+        <p:txBody>
+          <a:bodyPr wrap="square" rtlCol="0">
+            <a:spAutoFit/>
+          </a:bodyPr>
+          <a:lstStyle/>
+          <a:p>
+            <a:r>
+              <a:rPr lang="en-US" dirty="0"/>
+              <a:t>A potential Code for this would work as follows, but there are many ways of doing this.</a:t>
+            </a:r>
+          </a:p>
+        </p:txBody>
+      </p:sp>
+      <p:pic>
+        <p:nvPicPr>
+          <p:cNvPr id="7" name="Picture 6">
+            <a:extLst>
+              <a:ext uri="{FF2B5EF4-FFF2-40B4-BE49-F238E27FC236}">
+                <a16:creationId xmlns:a16="http://schemas.microsoft.com/office/drawing/2014/main" id="{0AFBB22F-B82B-43DE-D334-7C32BA2BC426}"/>
+              </a:ext>
+            </a:extLst>
+          </p:cNvPr>
+          <p:cNvPicPr>
+            <a:picLocks noChangeAspect="1"/>
+          </p:cNvPicPr>
+          <p:nvPr/>
+        </p:nvPicPr>
+        <p:blipFill>
+          <a:blip r:embed="rId2"/>
+          <a:stretch>
+            <a:fillRect/>
+          </a:stretch>
+        </p:blipFill>
+        <p:spPr>
+          <a:xfrm>
+            <a:off x="820662" y="2627940"/>
+            <a:ext cx="6383120" cy="3643857"/>
+          </a:xfrm>
+          <a:prstGeom prst="rect">
+            <a:avLst/>
+          </a:prstGeom>
+        </p:spPr>
+      </p:pic>
+      <p:sp>
+        <p:nvSpPr>
+          <p:cNvPr id="9" name="TextBox 8">
+            <a:extLst>
+              <a:ext uri="{FF2B5EF4-FFF2-40B4-BE49-F238E27FC236}">
+                <a16:creationId xmlns:a16="http://schemas.microsoft.com/office/drawing/2014/main" id="{4CF13B1A-E0BC-F314-8FBD-D65EA4A2A971}"/>
+              </a:ext>
+            </a:extLst>
+          </p:cNvPr>
+          <p:cNvSpPr txBox="1"/>
+          <p:nvPr/>
+        </p:nvSpPr>
+        <p:spPr>
+          <a:xfrm>
+            <a:off x="277437" y="6550503"/>
+            <a:ext cx="7217525" cy="2308324"/>
+          </a:xfrm>
+          <a:prstGeom prst="rect">
+            <a:avLst/>
+          </a:prstGeom>
+          <a:noFill/>
+        </p:spPr>
+        <p:txBody>
+          <a:bodyPr wrap="square" rtlCol="0">
+            <a:spAutoFit/>
+          </a:bodyPr>
+          <a:lstStyle/>
+          <a:p>
+            <a:r>
+              <a:rPr lang="en-US" dirty="0"/>
+              <a:t>And just like that, we made a leaderboard.</a:t>
+            </a:r>
+          </a:p>
+          <a:p>
+            <a:endParaRPr lang="en-US" dirty="0"/>
+          </a:p>
+          <a:p>
+            <a:r>
+              <a:rPr lang="en-US" dirty="0"/>
+              <a:t>Now, this whole line of code does one function, so lets try using custom blocks to simplify it. A custom block takes a whole set of code, and condenses it into one block which you could place anywhere for a given sprite. These blocks also have inputs, so we can input score, but if we wanted to look at another variable, such as the number of times played, we could replace it in one location rather than everywhere in the code.</a:t>
+            </a:r>
+          </a:p>
+        </p:txBody>
+      </p:sp>
+    </p:spTree>
+    <p:extLst>
+      <p:ext uri="{BB962C8B-B14F-4D97-AF65-F5344CB8AC3E}">
+        <p14:creationId xmlns:p14="http://schemas.microsoft.com/office/powerpoint/2010/main" val="4181825164"/>
+      </p:ext>
+    </p:extLst>
+  </p:cSld>
+  <p:clrMapOvr>
+    <a:masterClrMapping/>
+  </p:clrMapOvr>
+</p:sld>
+</file>
+
+<file path=ppt/slides/slide24.xml><?xml version="1.0" encoding="utf-8"?>
+<p:sld xmlns:a="http://schemas.openxmlformats.org/drawingml/2006/main" xmlns:r="http://schemas.openxmlformats.org/officeDocument/2006/relationships" xmlns:p="http://schemas.openxmlformats.org/presentationml/2006/main">
+  <p:cSld>
+    <p:spTree>
+      <p:nvGrpSpPr>
+        <p:cNvPr id="1" name=""/>
+        <p:cNvGrpSpPr/>
+        <p:nvPr/>
+      </p:nvGrpSpPr>
+      <p:grpSpPr>
+        <a:xfrm>
+          <a:off x="0" y="0"/>
+          <a:ext cx="0" cy="0"/>
+          <a:chOff x="0" y="0"/>
+          <a:chExt cx="0" cy="0"/>
+        </a:xfrm>
+      </p:grpSpPr>
+      <p:sp>
+        <p:nvSpPr>
+          <p:cNvPr id="4" name="Title 3">
+            <a:extLst>
+              <a:ext uri="{FF2B5EF4-FFF2-40B4-BE49-F238E27FC236}">
+                <a16:creationId xmlns:a16="http://schemas.microsoft.com/office/drawing/2014/main" id="{4803E82E-B25A-4A73-94A2-BBE1E2927A43}"/>
+              </a:ext>
+            </a:extLst>
+          </p:cNvPr>
+          <p:cNvSpPr>
+            <a:spLocks noGrp="1"/>
+          </p:cNvSpPr>
+          <p:nvPr>
+            <p:ph type="ctrTitle"/>
+          </p:nvPr>
+        </p:nvSpPr>
+        <p:spPr>
+          <a:xfrm>
+            <a:off x="189071" y="809625"/>
+            <a:ext cx="7394258" cy="742608"/>
+          </a:xfrm>
+        </p:spPr>
+        <p:txBody>
+          <a:bodyPr>
+            <a:normAutofit fontScale="90000"/>
+          </a:bodyPr>
+          <a:lstStyle/>
+          <a:p>
+            <a:r>
+              <a:rPr lang="en-US" dirty="0"/>
+              <a:t>Simplifying Code with Custom Blocks</a:t>
+            </a:r>
+          </a:p>
+        </p:txBody>
+      </p:sp>
+      <p:sp>
+        <p:nvSpPr>
+          <p:cNvPr id="3" name="TextBox 2">
+            <a:extLst>
+              <a:ext uri="{FF2B5EF4-FFF2-40B4-BE49-F238E27FC236}">
+                <a16:creationId xmlns:a16="http://schemas.microsoft.com/office/drawing/2014/main" id="{F08952E6-8944-6E4A-FB57-AA84F0659CA5}"/>
+              </a:ext>
+            </a:extLst>
+          </p:cNvPr>
+          <p:cNvSpPr txBox="1"/>
+          <p:nvPr/>
+        </p:nvSpPr>
+        <p:spPr>
+          <a:xfrm>
+            <a:off x="365803" y="1702903"/>
+            <a:ext cx="7217525" cy="646331"/>
+          </a:xfrm>
+          <a:prstGeom prst="rect">
+            <a:avLst/>
+          </a:prstGeom>
+          <a:noFill/>
+        </p:spPr>
+        <p:txBody>
+          <a:bodyPr wrap="square" rtlCol="0">
+            <a:spAutoFit/>
+          </a:bodyPr>
+          <a:lstStyle/>
+          <a:p>
+            <a:r>
+              <a:rPr lang="en-US" dirty="0"/>
+              <a:t>A potential Code for this would work as follows, but there are many ways of doing this.</a:t>
+            </a:r>
+          </a:p>
+        </p:txBody>
+      </p:sp>
+      <p:sp>
+        <p:nvSpPr>
+          <p:cNvPr id="9" name="TextBox 8">
+            <a:extLst>
+              <a:ext uri="{FF2B5EF4-FFF2-40B4-BE49-F238E27FC236}">
+                <a16:creationId xmlns:a16="http://schemas.microsoft.com/office/drawing/2014/main" id="{4CF13B1A-E0BC-F314-8FBD-D65EA4A2A971}"/>
+              </a:ext>
+            </a:extLst>
+          </p:cNvPr>
+          <p:cNvSpPr txBox="1"/>
+          <p:nvPr/>
+        </p:nvSpPr>
+        <p:spPr>
+          <a:xfrm>
+            <a:off x="277437" y="5510594"/>
+            <a:ext cx="7217525" cy="1477328"/>
+          </a:xfrm>
+          <a:prstGeom prst="rect">
+            <a:avLst/>
+          </a:prstGeom>
+          <a:noFill/>
+        </p:spPr>
+        <p:txBody>
+          <a:bodyPr wrap="square" rtlCol="0">
+            <a:spAutoFit/>
+          </a:bodyPr>
+          <a:lstStyle/>
+          <a:p>
+            <a:r>
+              <a:rPr lang="en-US" dirty="0"/>
+              <a:t>Another great effect of this function is that you can run entire sections as one block of code, by checking “Run without screen refresh”, the block will run as though everything within it is carried out between frame updates. This is extremely useful for large or visually oriented portions of code, and is also used for stuff such as physics in games and more.</a:t>
+            </a:r>
+          </a:p>
+        </p:txBody>
+      </p:sp>
+      <p:pic>
+        <p:nvPicPr>
+          <p:cNvPr id="5" name="Picture 4">
+            <a:extLst>
+              <a:ext uri="{FF2B5EF4-FFF2-40B4-BE49-F238E27FC236}">
+                <a16:creationId xmlns:a16="http://schemas.microsoft.com/office/drawing/2014/main" id="{2796D722-69FC-01D9-6E0D-53024788278B}"/>
+              </a:ext>
+            </a:extLst>
+          </p:cNvPr>
+          <p:cNvPicPr>
+            <a:picLocks noChangeAspect="1"/>
+          </p:cNvPicPr>
+          <p:nvPr/>
+        </p:nvPicPr>
+        <p:blipFill>
+          <a:blip r:embed="rId2"/>
+          <a:stretch>
+            <a:fillRect/>
+          </a:stretch>
+        </p:blipFill>
+        <p:spPr>
+          <a:xfrm>
+            <a:off x="320956" y="6987922"/>
+            <a:ext cx="3843341" cy="2876595"/>
+          </a:xfrm>
+          <a:prstGeom prst="rect">
+            <a:avLst/>
+          </a:prstGeom>
+        </p:spPr>
+      </p:pic>
+      <p:pic>
+        <p:nvPicPr>
+          <p:cNvPr id="8" name="Picture 7">
+            <a:extLst>
+              <a:ext uri="{FF2B5EF4-FFF2-40B4-BE49-F238E27FC236}">
+                <a16:creationId xmlns:a16="http://schemas.microsoft.com/office/drawing/2014/main" id="{9D55ECCC-FD7E-BFBF-1D14-6DC3770396BC}"/>
+              </a:ext>
+            </a:extLst>
+          </p:cNvPr>
+          <p:cNvPicPr>
+            <a:picLocks noChangeAspect="1"/>
+          </p:cNvPicPr>
+          <p:nvPr/>
+        </p:nvPicPr>
+        <p:blipFill>
+          <a:blip r:embed="rId3"/>
+          <a:stretch>
+            <a:fillRect/>
+          </a:stretch>
+        </p:blipFill>
+        <p:spPr>
+          <a:xfrm>
+            <a:off x="0" y="2751867"/>
+            <a:ext cx="7772400" cy="2356093"/>
+          </a:xfrm>
+          <a:prstGeom prst="rect">
+            <a:avLst/>
+          </a:prstGeom>
+        </p:spPr>
+      </p:pic>
+    </p:spTree>
+    <p:extLst>
+      <p:ext uri="{BB962C8B-B14F-4D97-AF65-F5344CB8AC3E}">
+        <p14:creationId xmlns:p14="http://schemas.microsoft.com/office/powerpoint/2010/main" val="2913752388"/>
+      </p:ext>
+    </p:extLst>
+  </p:cSld>
+  <p:clrMapOvr>
+    <a:masterClrMapping/>
+  </p:clrMapOvr>
+</p:sld>
+</file>
+
+<file path=ppt/slides/slide25.xml><?xml version="1.0" encoding="utf-8"?>
+<p:sld xmlns:a="http://schemas.openxmlformats.org/drawingml/2006/main" xmlns:r="http://schemas.openxmlformats.org/officeDocument/2006/relationships" xmlns:p="http://schemas.openxmlformats.org/presentationml/2006/main">
+  <p:cSld>
+    <p:spTree>
+      <p:nvGrpSpPr>
+        <p:cNvPr id="1" name=""/>
+        <p:cNvGrpSpPr/>
+        <p:nvPr/>
+      </p:nvGrpSpPr>
+      <p:grpSpPr>
+        <a:xfrm>
+          <a:off x="0" y="0"/>
+          <a:ext cx="0" cy="0"/>
+          <a:chOff x="0" y="0"/>
+          <a:chExt cx="0" cy="0"/>
+        </a:xfrm>
+      </p:grpSpPr>
+      <p:sp>
+        <p:nvSpPr>
+          <p:cNvPr id="2" name="Title 1">
+            <a:extLst>
+              <a:ext uri="{FF2B5EF4-FFF2-40B4-BE49-F238E27FC236}">
+                <a16:creationId xmlns:a16="http://schemas.microsoft.com/office/drawing/2014/main" id="{3210845B-407A-F175-8206-E1E4B9F7E837}"/>
+              </a:ext>
+            </a:extLst>
+          </p:cNvPr>
+          <p:cNvSpPr>
+            <a:spLocks noGrp="1"/>
+          </p:cNvSpPr>
+          <p:nvPr>
+            <p:ph type="title"/>
+          </p:nvPr>
+        </p:nvSpPr>
+        <p:spPr/>
+        <p:txBody>
+          <a:bodyPr/>
+          <a:lstStyle/>
+          <a:p>
+            <a:r>
+              <a:rPr lang="en-US" dirty="0"/>
+              <a:t>Bugs and Design Oversights</a:t>
+            </a:r>
+          </a:p>
+        </p:txBody>
+      </p:sp>
+      <p:sp>
+        <p:nvSpPr>
+          <p:cNvPr id="3" name="Content Placeholder 2">
+            <a:extLst>
+              <a:ext uri="{FF2B5EF4-FFF2-40B4-BE49-F238E27FC236}">
+                <a16:creationId xmlns:a16="http://schemas.microsoft.com/office/drawing/2014/main" id="{1CDEC476-A7E4-0EDA-12A8-D39594CD48A4}"/>
+              </a:ext>
+            </a:extLst>
+          </p:cNvPr>
+          <p:cNvSpPr>
+            <a:spLocks noGrp="1"/>
+          </p:cNvSpPr>
+          <p:nvPr>
+            <p:ph idx="1"/>
+          </p:nvPr>
+        </p:nvSpPr>
+        <p:spPr/>
+        <p:txBody>
+          <a:bodyPr/>
+          <a:lstStyle/>
+          <a:p>
+            <a:pPr marL="0" indent="0">
+              <a:buNone/>
+            </a:pPr>
+            <a:r>
+              <a:rPr lang="en-US" dirty="0"/>
+              <a:t>While this project is great for learning different blocks and what they do, it is not the greatest or cleanest running code. What bugs do you see? Are there any designed oversights that might lead to exploits from the player? Are all of these unintended attributes of our code necessarily bad? How can we fix these bugs?</a:t>
+            </a:r>
+          </a:p>
+          <a:p>
+            <a:pPr marL="0" indent="0">
+              <a:buNone/>
+            </a:pPr>
+            <a:endParaRPr lang="en-US" dirty="0"/>
+          </a:p>
+          <a:p>
+            <a:pPr marL="0" indent="0">
+              <a:buNone/>
+            </a:pPr>
+            <a:r>
+              <a:rPr lang="en-US" dirty="0"/>
+              <a:t>Lets discuss it.</a:t>
+            </a:r>
+          </a:p>
+        </p:txBody>
+      </p:sp>
+    </p:spTree>
+    <p:extLst>
+      <p:ext uri="{BB962C8B-B14F-4D97-AF65-F5344CB8AC3E}">
+        <p14:creationId xmlns:p14="http://schemas.microsoft.com/office/powerpoint/2010/main" val="2811413681"/>
+      </p:ext>
+    </p:extLst>
+  </p:cSld>
+  <p:clrMapOvr>
+    <a:masterClrMapping/>
+  </p:clrMapOvr>
+</p:sld>
+</file>
+
+<file path=ppt/slides/slide26.xml><?xml version="1.0" encoding="utf-8"?>
+<p:sld xmlns:a="http://schemas.openxmlformats.org/drawingml/2006/main" xmlns:r="http://schemas.openxmlformats.org/officeDocument/2006/relationships" xmlns:p="http://schemas.openxmlformats.org/presentationml/2006/main">
+  <p:cSld>
+    <p:spTree>
+      <p:nvGrpSpPr>
+        <p:cNvPr id="1" name=""/>
+        <p:cNvGrpSpPr/>
+        <p:nvPr/>
+      </p:nvGrpSpPr>
+      <p:grpSpPr>
+        <a:xfrm>
+          <a:off x="0" y="0"/>
+          <a:ext cx="0" cy="0"/>
+          <a:chOff x="0" y="0"/>
+          <a:chExt cx="0" cy="0"/>
+        </a:xfrm>
+      </p:grpSpPr>
+      <p:sp>
+        <p:nvSpPr>
+          <p:cNvPr id="2" name="Title 1">
+            <a:extLst>
+              <a:ext uri="{FF2B5EF4-FFF2-40B4-BE49-F238E27FC236}">
+                <a16:creationId xmlns:a16="http://schemas.microsoft.com/office/drawing/2014/main" id="{8A151CF9-6A01-E1E1-708C-8852E45A3C10}"/>
+              </a:ext>
+            </a:extLst>
+          </p:cNvPr>
+          <p:cNvSpPr>
+            <a:spLocks noGrp="1"/>
+          </p:cNvSpPr>
+          <p:nvPr>
+            <p:ph type="title"/>
+          </p:nvPr>
+        </p:nvSpPr>
+        <p:spPr>
+          <a:xfrm>
+            <a:off x="534353" y="-248249"/>
+            <a:ext cx="6703695" cy="1944159"/>
+          </a:xfrm>
+        </p:spPr>
+        <p:txBody>
+          <a:bodyPr/>
+          <a:lstStyle/>
+          <a:p>
+            <a:r>
+              <a:rPr lang="en-US" dirty="0"/>
+              <a:t>Uploading our games to the GitHub</a:t>
+            </a:r>
+          </a:p>
+        </p:txBody>
+      </p:sp>
+      <p:sp>
+        <p:nvSpPr>
+          <p:cNvPr id="3" name="Content Placeholder 2">
+            <a:extLst>
+              <a:ext uri="{FF2B5EF4-FFF2-40B4-BE49-F238E27FC236}">
+                <a16:creationId xmlns:a16="http://schemas.microsoft.com/office/drawing/2014/main" id="{A06C6B90-3EA1-3765-1BB2-77B9533F5777}"/>
+              </a:ext>
+            </a:extLst>
+          </p:cNvPr>
+          <p:cNvSpPr>
+            <a:spLocks noGrp="1"/>
+          </p:cNvSpPr>
+          <p:nvPr>
+            <p:ph idx="1"/>
+          </p:nvPr>
+        </p:nvSpPr>
+        <p:spPr>
+          <a:xfrm>
+            <a:off x="534353" y="1355936"/>
+            <a:ext cx="6703695" cy="6381962"/>
+          </a:xfrm>
+        </p:spPr>
+        <p:txBody>
+          <a:bodyPr>
+            <a:normAutofit lnSpcReduction="10000"/>
+          </a:bodyPr>
+          <a:lstStyle/>
+          <a:p>
+            <a:pPr marL="0" indent="0">
+              <a:buNone/>
+            </a:pPr>
+            <a:r>
+              <a:rPr lang="en-US" dirty="0"/>
+              <a:t>Just like last time, we will be pushing our code to the GitHub page. This time we will be uploading an entire SB3 File (Scratch project). To do this, save your project somewhere on your computer, be sure to name it something that is not the original file name (Meeting 2 Code + your GitHub Username would be preferable).</a:t>
+            </a:r>
+          </a:p>
+          <a:p>
+            <a:pPr marL="0" indent="0">
+              <a:buNone/>
+            </a:pPr>
+            <a:endParaRPr lang="en-US" dirty="0"/>
+          </a:p>
+          <a:p>
+            <a:pPr marL="0" indent="0">
+              <a:buNone/>
+            </a:pPr>
+            <a:r>
+              <a:rPr lang="en-US" dirty="0"/>
+              <a:t>From here navigate to the meeting 2 folder and push your project. You will have to be a collaborator to do this, so if you were not here last time, fill out the attached form to be added as a collaborator:</a:t>
+            </a:r>
+          </a:p>
+          <a:p>
+            <a:pPr marL="0" indent="0">
+              <a:buNone/>
+            </a:pPr>
+            <a:r>
+              <a:rPr lang="en-US" dirty="0">
+                <a:hlinkClick r:id="rId2"/>
+              </a:rPr>
+              <a:t>https://forms.office.com/Pages/ResponsePage.aspx?id=VGZw_NSNrUO32IhD8WGXXigPwIXu8JZHuKz_ckepTQJUNVJNQko2TjJHSlBNSVJZNUxJSDFOVklENS4u</a:t>
+            </a:r>
+            <a:endParaRPr lang="en-US" dirty="0"/>
+          </a:p>
+          <a:p>
+            <a:pPr marL="0" indent="0">
+              <a:buNone/>
+            </a:pPr>
+            <a:endParaRPr lang="en-US" dirty="0"/>
+          </a:p>
+          <a:p>
+            <a:pPr marL="0" indent="0">
+              <a:buNone/>
+            </a:pPr>
+            <a:r>
+              <a:rPr lang="en-US" dirty="0"/>
+              <a:t>GitHub Link:</a:t>
+            </a:r>
+          </a:p>
+          <a:p>
+            <a:pPr marL="0" indent="0">
+              <a:buNone/>
+            </a:pPr>
+            <a:r>
+              <a:rPr lang="en-US" dirty="0">
+                <a:hlinkClick r:id="rId3"/>
+              </a:rPr>
+              <a:t>https://github.com/tommyrohmann/Coding-Club</a:t>
+            </a:r>
+            <a:endParaRPr lang="en-US" dirty="0"/>
+          </a:p>
+          <a:p>
+            <a:pPr marL="0" indent="0">
+              <a:buNone/>
+            </a:pPr>
+            <a:endParaRPr lang="en-US" dirty="0"/>
+          </a:p>
+        </p:txBody>
+      </p:sp>
+    </p:spTree>
+    <p:extLst>
+      <p:ext uri="{BB962C8B-B14F-4D97-AF65-F5344CB8AC3E}">
+        <p14:creationId xmlns:p14="http://schemas.microsoft.com/office/powerpoint/2010/main" val="2763886158"/>
+      </p:ext>
+    </p:extLst>
+  </p:cSld>
+  <p:clrMapOvr>
+    <a:masterClrMapping/>
+  </p:clrMapOvr>
+</p:sld>
+</file>
+
+<file path=ppt/slides/slide27.xml><?xml version="1.0" encoding="utf-8"?>
+<p:sld xmlns:a="http://schemas.openxmlformats.org/drawingml/2006/main" xmlns:r="http://schemas.openxmlformats.org/officeDocument/2006/relationships" xmlns:p="http://schemas.openxmlformats.org/presentationml/2006/main">
+  <p:cSld>
+    <p:spTree>
+      <p:nvGrpSpPr>
+        <p:cNvPr id="1" name=""/>
+        <p:cNvGrpSpPr/>
+        <p:nvPr/>
+      </p:nvGrpSpPr>
+      <p:grpSpPr>
+        <a:xfrm>
+          <a:off x="0" y="0"/>
+          <a:ext cx="0" cy="0"/>
+          <a:chOff x="0" y="0"/>
+          <a:chExt cx="0" cy="0"/>
+        </a:xfrm>
+      </p:grpSpPr>
+      <p:sp>
+        <p:nvSpPr>
+          <p:cNvPr id="4" name="Title 3">
+            <a:extLst>
+              <a:ext uri="{FF2B5EF4-FFF2-40B4-BE49-F238E27FC236}">
+                <a16:creationId xmlns:a16="http://schemas.microsoft.com/office/drawing/2014/main" id="{4803E82E-B25A-4A73-94A2-BBE1E2927A43}"/>
+              </a:ext>
+            </a:extLst>
+          </p:cNvPr>
+          <p:cNvSpPr>
+            <a:spLocks noGrp="1"/>
+          </p:cNvSpPr>
+          <p:nvPr>
+            <p:ph type="ctrTitle"/>
+          </p:nvPr>
+        </p:nvSpPr>
+        <p:spPr>
+          <a:xfrm>
+            <a:off x="189071" y="809625"/>
+            <a:ext cx="7394258" cy="742608"/>
+          </a:xfrm>
+        </p:spPr>
+        <p:txBody>
+          <a:bodyPr>
+            <a:normAutofit fontScale="90000"/>
+          </a:bodyPr>
+          <a:lstStyle/>
+          <a:p>
+            <a:r>
+              <a:rPr lang="en-US" dirty="0"/>
+              <a:t>That’s all!</a:t>
+            </a:r>
+          </a:p>
+        </p:txBody>
+      </p:sp>
+      <p:sp>
+        <p:nvSpPr>
+          <p:cNvPr id="3" name="TextBox 2">
+            <a:extLst>
+              <a:ext uri="{FF2B5EF4-FFF2-40B4-BE49-F238E27FC236}">
+                <a16:creationId xmlns:a16="http://schemas.microsoft.com/office/drawing/2014/main" id="{F08952E6-8944-6E4A-FB57-AA84F0659CA5}"/>
+              </a:ext>
+            </a:extLst>
+          </p:cNvPr>
+          <p:cNvSpPr txBox="1"/>
+          <p:nvPr/>
+        </p:nvSpPr>
+        <p:spPr>
+          <a:xfrm>
+            <a:off x="365803" y="1702903"/>
+            <a:ext cx="7217525" cy="7017306"/>
+          </a:xfrm>
+          <a:prstGeom prst="rect">
+            <a:avLst/>
+          </a:prstGeom>
+          <a:noFill/>
+        </p:spPr>
+        <p:txBody>
+          <a:bodyPr wrap="square" rtlCol="0">
+            <a:spAutoFit/>
+          </a:bodyPr>
+          <a:lstStyle/>
+          <a:p>
+            <a:r>
+              <a:rPr lang="en-US" dirty="0"/>
+              <a:t>So, we made a game. What did we learn by making it?</a:t>
+            </a:r>
+          </a:p>
+          <a:p>
+            <a:endParaRPr lang="en-US" dirty="0"/>
+          </a:p>
+          <a:p>
+            <a:pPr marL="285750" indent="-285750">
+              <a:buFontTx/>
+              <a:buChar char="-"/>
+            </a:pPr>
+            <a:r>
+              <a:rPr lang="en-US" dirty="0"/>
+              <a:t>How a game is structured in a game loop</a:t>
+            </a:r>
+          </a:p>
+          <a:p>
+            <a:pPr marL="285750" indent="-285750">
+              <a:buFontTx/>
+              <a:buChar char="-"/>
+            </a:pPr>
+            <a:r>
+              <a:rPr lang="en-US" dirty="0"/>
+              <a:t>How to use variables and lists</a:t>
+            </a:r>
+          </a:p>
+          <a:p>
+            <a:pPr marL="285750" indent="-285750">
+              <a:buFontTx/>
+              <a:buChar char="-"/>
+            </a:pPr>
+            <a:r>
+              <a:rPr lang="en-US" dirty="0"/>
+              <a:t>How to use custom blocks</a:t>
+            </a:r>
+          </a:p>
+          <a:p>
+            <a:pPr marL="285750" indent="-285750">
+              <a:buFontTx/>
+              <a:buChar char="-"/>
+            </a:pPr>
+            <a:r>
+              <a:rPr lang="en-US" dirty="0"/>
+              <a:t>Using sensing and operator blocks</a:t>
+            </a:r>
+          </a:p>
+          <a:p>
+            <a:pPr marL="285750" indent="-285750">
+              <a:buFontTx/>
+              <a:buChar char="-"/>
+            </a:pPr>
+            <a:r>
+              <a:rPr lang="en-US" dirty="0"/>
+              <a:t>Various loops and if statements</a:t>
+            </a:r>
+          </a:p>
+          <a:p>
+            <a:pPr marL="285750" indent="-285750">
+              <a:buFontTx/>
+              <a:buChar char="-"/>
+            </a:pPr>
+            <a:r>
+              <a:rPr lang="en-US" dirty="0"/>
+              <a:t>Signals</a:t>
+            </a:r>
+          </a:p>
+          <a:p>
+            <a:pPr marL="285750" indent="-285750">
+              <a:buFontTx/>
+              <a:buChar char="-"/>
+            </a:pPr>
+            <a:endParaRPr lang="en-US" dirty="0"/>
+          </a:p>
+          <a:p>
+            <a:r>
+              <a:rPr lang="en-US" dirty="0"/>
+              <a:t>As you can see, in coding, a lot of making a project is a bunch of smaller projects being added to a larger whole. While this game is relatively bare bones, we only worked on it for roughly an hour.</a:t>
+            </a:r>
+          </a:p>
+          <a:p>
+            <a:endParaRPr lang="en-US" dirty="0"/>
+          </a:p>
+          <a:p>
+            <a:r>
+              <a:rPr lang="en-US" dirty="0"/>
+              <a:t>With this structure of code, it may seem like adding functionality such as additional states to the game loop can get a little complicated. A big part of coding is learning how to structure the code so it can be easily iterated on and added to.</a:t>
+            </a:r>
+          </a:p>
+          <a:p>
+            <a:endParaRPr lang="en-US" dirty="0"/>
+          </a:p>
+          <a:p>
+            <a:r>
+              <a:rPr lang="en-US" dirty="0"/>
+              <a:t>Next class we will build on what we learned by discussing how we can structure our game loop in a more organized manner, best practices for making our game work, and how we can go about programming various types of game in Scratch.</a:t>
+            </a:r>
+          </a:p>
+          <a:p>
+            <a:endParaRPr lang="en-US" dirty="0"/>
+          </a:p>
+          <a:p>
+            <a:r>
+              <a:rPr lang="en-US" dirty="0"/>
+              <a:t>Thanks for coming!</a:t>
+            </a:r>
+          </a:p>
+          <a:p>
+            <a:pPr marL="285750" indent="-285750">
+              <a:buFontTx/>
+              <a:buChar char="-"/>
+            </a:pPr>
+            <a:endParaRPr lang="en-US" dirty="0"/>
+          </a:p>
+        </p:txBody>
+      </p:sp>
+    </p:spTree>
+    <p:extLst>
+      <p:ext uri="{BB962C8B-B14F-4D97-AF65-F5344CB8AC3E}">
+        <p14:creationId xmlns:p14="http://schemas.microsoft.com/office/powerpoint/2010/main" val="2697906079"/>
       </p:ext>
     </p:extLst>
   </p:cSld>
@@ -5122,7 +7788,7 @@
         <p:spPr>
           <a:xfrm>
             <a:off x="322729" y="1652067"/>
-            <a:ext cx="7115416" cy="1754326"/>
+            <a:ext cx="7115416" cy="3970318"/>
           </a:xfrm>
           <a:prstGeom prst="rect">
             <a:avLst/>
@@ -5156,10 +7822,67 @@
             <a:endParaRPr lang="en-US" dirty="0"/>
           </a:p>
           <a:p>
-            <a:endParaRPr lang="en-US" dirty="0"/>
-          </a:p>
-        </p:txBody>
-      </p:sp>
+            <a:r>
+              <a:rPr lang="en-US" dirty="0"/>
+              <a:t>Download Meeting 2 Project.sb3 through the path shown below.</a:t>
+            </a:r>
+          </a:p>
+          <a:p>
+            <a:endParaRPr lang="en-US" dirty="0"/>
+          </a:p>
+          <a:p>
+            <a:endParaRPr lang="en-US" dirty="0"/>
+          </a:p>
+          <a:p>
+            <a:endParaRPr lang="en-US" dirty="0"/>
+          </a:p>
+          <a:p>
+            <a:endParaRPr lang="en-US" dirty="0"/>
+          </a:p>
+          <a:p>
+            <a:endParaRPr lang="en-US" dirty="0"/>
+          </a:p>
+          <a:p>
+            <a:endParaRPr lang="en-US" dirty="0"/>
+          </a:p>
+          <a:p>
+            <a:r>
+              <a:rPr lang="en-US" dirty="0"/>
+              <a:t>Open the downloaded file on scratch. This will be our starting point for the project today.</a:t>
+            </a:r>
+          </a:p>
+        </p:txBody>
+      </p:sp>
+      <p:pic>
+        <p:nvPicPr>
+          <p:cNvPr id="5" name="Picture 4">
+            <a:extLst>
+              <a:ext uri="{FF2B5EF4-FFF2-40B4-BE49-F238E27FC236}">
+                <a16:creationId xmlns:a16="http://schemas.microsoft.com/office/drawing/2014/main" id="{1E4C8F63-08AB-CFD7-CAF2-638EA5442378}"/>
+              </a:ext>
+            </a:extLst>
+          </p:cNvPr>
+          <p:cNvPicPr>
+            <a:picLocks noChangeAspect="1"/>
+          </p:cNvPicPr>
+          <p:nvPr/>
+        </p:nvPicPr>
+        <p:blipFill>
+          <a:blip r:embed="rId3"/>
+          <a:stretch>
+            <a:fillRect/>
+          </a:stretch>
+        </p:blipFill>
+        <p:spPr>
+          <a:xfrm>
+            <a:off x="488896" y="3516335"/>
+            <a:ext cx="6783081" cy="1366396"/>
+          </a:xfrm>
+          <a:prstGeom prst="rect">
+            <a:avLst/>
+          </a:prstGeom>
+        </p:spPr>
+      </p:pic>
     </p:spTree>
     <p:extLst>
       <p:ext uri="{BB962C8B-B14F-4D97-AF65-F5344CB8AC3E}">
@@ -5470,7 +8193,7 @@
         <p:spPr>
           <a:xfrm>
             <a:off x="653143" y="1705855"/>
-            <a:ext cx="6477640" cy="4801314"/>
+            <a:ext cx="6477640" cy="5078313"/>
           </a:xfrm>
           <a:prstGeom prst="rect">
             <a:avLst/>
@@ -5503,7 +8226,7 @@
           <a:p>
             <a:r>
               <a:rPr lang="en-US" dirty="0"/>
-              <a:t>Create a new variable and call it “Player Speed”. Lets add some code to set the variable when the green flag is first pressed, and then update the code as follows:</a:t>
+              <a:t>Create a new variable and call it “Player Speed” For now, when we make variables, check “For all sprites”. Lets add some code to set the variable when the green flag is first pressed, and then update the code as follows:</a:t>
             </a:r>
           </a:p>
           <a:p>
@@ -5533,7 +8256,7 @@
         </p:blipFill>
         <p:spPr>
           <a:xfrm>
-            <a:off x="-369915" y="6285540"/>
+            <a:off x="-369915" y="6533195"/>
             <a:ext cx="3339794" cy="2418811"/>
           </a:xfrm>
           <a:prstGeom prst="rect">
@@ -5563,7 +8286,7 @@
         </p:blipFill>
         <p:spPr>
           <a:xfrm>
-            <a:off x="2812100" y="6181794"/>
+            <a:off x="2812100" y="6429449"/>
             <a:ext cx="1804965" cy="3265699"/>
           </a:xfrm>
           <a:prstGeom prst="rect">

</xml_diff>